<commit_message>
added known bugs to the ptx. need to check it
</commit_message>
<xml_diff>
--- a/docs/Blockchain Final Project.pptx
+++ b/docs/Blockchain Final Project.pptx
@@ -6,7 +6,7 @@
     <p:sldMasterId id="2147483660" r:id="rId2"/>
   </p:sldMasterIdLst>
   <p:notesMasterIdLst>
-    <p:notesMasterId r:id="rId23"/>
+    <p:notesMasterId r:id="rId25"/>
   </p:notesMasterIdLst>
   <p:sldIdLst>
     <p:sldId id="284" r:id="rId3"/>
@@ -16,19 +16,21 @@
     <p:sldId id="287" r:id="rId7"/>
     <p:sldId id="288" r:id="rId8"/>
     <p:sldId id="294" r:id="rId9"/>
-    <p:sldId id="304" r:id="rId10"/>
-    <p:sldId id="293" r:id="rId11"/>
-    <p:sldId id="295" r:id="rId12"/>
-    <p:sldId id="296" r:id="rId13"/>
-    <p:sldId id="298" r:id="rId14"/>
-    <p:sldId id="299" r:id="rId15"/>
-    <p:sldId id="300" r:id="rId16"/>
-    <p:sldId id="301" r:id="rId17"/>
-    <p:sldId id="302" r:id="rId18"/>
-    <p:sldId id="257" r:id="rId19"/>
-    <p:sldId id="290" r:id="rId20"/>
-    <p:sldId id="283" r:id="rId21"/>
-    <p:sldId id="279" r:id="rId22"/>
+    <p:sldId id="306" r:id="rId10"/>
+    <p:sldId id="305" r:id="rId11"/>
+    <p:sldId id="304" r:id="rId12"/>
+    <p:sldId id="293" r:id="rId13"/>
+    <p:sldId id="295" r:id="rId14"/>
+    <p:sldId id="296" r:id="rId15"/>
+    <p:sldId id="298" r:id="rId16"/>
+    <p:sldId id="299" r:id="rId17"/>
+    <p:sldId id="300" r:id="rId18"/>
+    <p:sldId id="301" r:id="rId19"/>
+    <p:sldId id="302" r:id="rId20"/>
+    <p:sldId id="257" r:id="rId21"/>
+    <p:sldId id="290" r:id="rId22"/>
+    <p:sldId id="283" r:id="rId23"/>
+    <p:sldId id="279" r:id="rId24"/>
   </p:sldIdLst>
   <p:sldSz cx="12192000" cy="6858000"/>
   <p:notesSz cx="6858000" cy="9144000"/>
@@ -1244,7 +1246,6 @@
           <a:noFill/>
         </a:ln>
       </dgm:spPr>
-      <dgm:extLst/>
     </dgm:pt>
     <dgm:pt modelId="{D9BA2201-0985-47AD-B292-FFA6AA6C776F}" type="pres">
       <dgm:prSet presAssocID="{F8E82FC2-ECE6-45B1-BB40-B45C8012AF21}" presName="spaceRect" presStyleCnt="0"/>
@@ -3274,7 +3275,7 @@
           <a:p>
             <a:fld id="{654EE165-1D20-432B-8391-AC81E3C78BFB}" type="datetimeFigureOut">
               <a:rPr lang="he-IL" smtClean="0"/>
-              <a:t>כ"ב/תמוז/תשע"ט</a:t>
+              <a:t>כ"ג/תמוז/תשע"ט</a:t>
             </a:fld>
             <a:endParaRPr lang="he-IL"/>
           </a:p>
@@ -3655,6 +3656,115 @@
   <p:cSld>
     <p:spTree>
       <p:nvGrpSpPr>
+        <p:cNvPr id="1" name="Shape 72"/>
+        <p:cNvGrpSpPr/>
+        <p:nvPr/>
+      </p:nvGrpSpPr>
+      <p:grpSpPr>
+        <a:xfrm>
+          <a:off x="0" y="0"/>
+          <a:ext cx="0" cy="0"/>
+          <a:chOff x="0" y="0"/>
+          <a:chExt cx="0" cy="0"/>
+        </a:xfrm>
+      </p:grpSpPr>
+      <p:sp>
+        <p:nvSpPr>
+          <p:cNvPr id="73" name="Google Shape;73;g35f391192_04:notes"/>
+          <p:cNvSpPr>
+            <a:spLocks noGrp="1" noRot="1" noChangeAspect="1"/>
+          </p:cNvSpPr>
+          <p:nvPr>
+            <p:ph type="sldImg" idx="2"/>
+          </p:nvPr>
+        </p:nvSpPr>
+        <p:spPr>
+          <a:xfrm>
+            <a:off x="381000" y="685800"/>
+            <a:ext cx="6096000" cy="3429000"/>
+          </a:xfrm>
+          <a:custGeom>
+            <a:avLst/>
+            <a:gdLst/>
+            <a:ahLst/>
+            <a:cxnLst/>
+            <a:rect l="l" t="t" r="r" b="b"/>
+            <a:pathLst>
+              <a:path w="120000" h="120000" extrusionOk="0">
+                <a:moveTo>
+                  <a:pt x="0" y="0"/>
+                </a:moveTo>
+                <a:lnTo>
+                  <a:pt x="120000" y="0"/>
+                </a:lnTo>
+                <a:lnTo>
+                  <a:pt x="120000" y="120000"/>
+                </a:lnTo>
+                <a:lnTo>
+                  <a:pt x="0" y="120000"/>
+                </a:lnTo>
+                <a:close/>
+              </a:path>
+            </a:pathLst>
+          </a:custGeom>
+        </p:spPr>
+      </p:sp>
+      <p:sp>
+        <p:nvSpPr>
+          <p:cNvPr id="74" name="Google Shape;74;g35f391192_04:notes"/>
+          <p:cNvSpPr txBox="1">
+            <a:spLocks noGrp="1"/>
+          </p:cNvSpPr>
+          <p:nvPr>
+            <p:ph type="body" idx="1"/>
+          </p:nvPr>
+        </p:nvSpPr>
+        <p:spPr>
+          <a:xfrm>
+            <a:off x="685800" y="4343400"/>
+            <a:ext cx="5486400" cy="4114800"/>
+          </a:xfrm>
+          <a:prstGeom prst="rect">
+            <a:avLst/>
+          </a:prstGeom>
+        </p:spPr>
+        <p:txBody>
+          <a:bodyPr spcFirstLastPara="1" wrap="square" lIns="91425" tIns="91425" rIns="91425" bIns="91425" anchor="t" anchorCtr="0">
+            <a:noAutofit/>
+          </a:bodyPr>
+          <a:lstStyle/>
+          <a:p>
+            <a:pPr marL="0" lvl="0" indent="0" algn="l" rtl="0">
+              <a:spcBef>
+                <a:spcPts val="0"/>
+              </a:spcBef>
+              <a:spcAft>
+                <a:spcPts val="0"/>
+              </a:spcAft>
+              <a:buNone/>
+            </a:pPr>
+            <a:endParaRPr/>
+          </a:p>
+        </p:txBody>
+      </p:sp>
+    </p:spTree>
+    <p:extLst>
+      <p:ext uri="{BB962C8B-B14F-4D97-AF65-F5344CB8AC3E}">
+        <p14:creationId xmlns:p14="http://schemas.microsoft.com/office/powerpoint/2010/main" val="1510877947"/>
+      </p:ext>
+    </p:extLst>
+  </p:cSld>
+  <p:clrMapOvr>
+    <a:masterClrMapping/>
+  </p:clrMapOvr>
+</p:notes>
+</file>
+
+<file path=ppt/notesSlides/notesSlide11.xml><?xml version="1.0" encoding="utf-8"?>
+<p:notes xmlns:a="http://schemas.openxmlformats.org/drawingml/2006/main" xmlns:r="http://schemas.openxmlformats.org/officeDocument/2006/relationships" xmlns:p="http://schemas.openxmlformats.org/presentationml/2006/main" showMasterSp="0" showMasterPhAnim="0">
+  <p:cSld>
+    <p:spTree>
+      <p:nvGrpSpPr>
         <p:cNvPr id="1" name="Shape 63"/>
         <p:cNvGrpSpPr/>
         <p:nvPr/>
@@ -3759,7 +3869,7 @@
 </p:notes>
 </file>
 
-<file path=ppt/notesSlides/notesSlide11.xml><?xml version="1.0" encoding="utf-8"?>
+<file path=ppt/notesSlides/notesSlide12.xml><?xml version="1.0" encoding="utf-8"?>
 <p:notes xmlns:a="http://schemas.openxmlformats.org/drawingml/2006/main" xmlns:r="http://schemas.openxmlformats.org/officeDocument/2006/relationships" xmlns:p="http://schemas.openxmlformats.org/presentationml/2006/main" showMasterSp="0" showMasterPhAnim="0">
   <p:cSld>
     <p:spTree>
@@ -3868,7 +3978,7 @@
 </p:notes>
 </file>
 
-<file path=ppt/notesSlides/notesSlide12.xml><?xml version="1.0" encoding="utf-8"?>
+<file path=ppt/notesSlides/notesSlide13.xml><?xml version="1.0" encoding="utf-8"?>
 <p:notes xmlns:a="http://schemas.openxmlformats.org/drawingml/2006/main" xmlns:r="http://schemas.openxmlformats.org/officeDocument/2006/relationships" xmlns:p="http://schemas.openxmlformats.org/presentationml/2006/main" showMasterSp="0" showMasterPhAnim="0">
   <p:cSld>
     <p:spTree>
@@ -3977,7 +4087,7 @@
 </p:notes>
 </file>
 
-<file path=ppt/notesSlides/notesSlide13.xml><?xml version="1.0" encoding="utf-8"?>
+<file path=ppt/notesSlides/notesSlide14.xml><?xml version="1.0" encoding="utf-8"?>
 <p:notes xmlns:a="http://schemas.openxmlformats.org/drawingml/2006/main" xmlns:r="http://schemas.openxmlformats.org/officeDocument/2006/relationships" xmlns:p="http://schemas.openxmlformats.org/presentationml/2006/main" showMasterSp="0" showMasterPhAnim="0">
   <p:cSld>
     <p:spTree>
@@ -4086,7 +4196,7 @@
 </p:notes>
 </file>
 
-<file path=ppt/notesSlides/notesSlide14.xml><?xml version="1.0" encoding="utf-8"?>
+<file path=ppt/notesSlides/notesSlide15.xml><?xml version="1.0" encoding="utf-8"?>
 <p:notes xmlns:a="http://schemas.openxmlformats.org/drawingml/2006/main" xmlns:r="http://schemas.openxmlformats.org/officeDocument/2006/relationships" xmlns:p="http://schemas.openxmlformats.org/presentationml/2006/main" showMasterSp="0" showMasterPhAnim="0">
   <p:cSld>
     <p:spTree>
@@ -4195,7 +4305,7 @@
 </p:notes>
 </file>
 
-<file path=ppt/notesSlides/notesSlide15.xml><?xml version="1.0" encoding="utf-8"?>
+<file path=ppt/notesSlides/notesSlide16.xml><?xml version="1.0" encoding="utf-8"?>
 <p:notes xmlns:a="http://schemas.openxmlformats.org/drawingml/2006/main" xmlns:r="http://schemas.openxmlformats.org/officeDocument/2006/relationships" xmlns:p="http://schemas.openxmlformats.org/presentationml/2006/main" showMasterSp="0" showMasterPhAnim="0">
   <p:cSld>
     <p:spTree>
@@ -4304,7 +4414,7 @@
 </p:notes>
 </file>
 
-<file path=ppt/notesSlides/notesSlide16.xml><?xml version="1.0" encoding="utf-8"?>
+<file path=ppt/notesSlides/notesSlide17.xml><?xml version="1.0" encoding="utf-8"?>
 <p:notes xmlns:a="http://schemas.openxmlformats.org/drawingml/2006/main" xmlns:r="http://schemas.openxmlformats.org/officeDocument/2006/relationships" xmlns:p="http://schemas.openxmlformats.org/presentationml/2006/main" showMasterSp="0" showMasterPhAnim="0">
   <p:cSld>
     <p:spTree>
@@ -4413,7 +4523,7 @@
 </p:notes>
 </file>
 
-<file path=ppt/notesSlides/notesSlide17.xml><?xml version="1.0" encoding="utf-8"?>
+<file path=ppt/notesSlides/notesSlide18.xml><?xml version="1.0" encoding="utf-8"?>
 <p:notes xmlns:a="http://schemas.openxmlformats.org/drawingml/2006/main" xmlns:r="http://schemas.openxmlformats.org/officeDocument/2006/relationships" xmlns:p="http://schemas.openxmlformats.org/presentationml/2006/main" showMasterSp="0" showMasterPhAnim="0">
   <p:cSld>
     <p:spTree>
@@ -4963,6 +5073,115 @@
   <p:cSld>
     <p:spTree>
       <p:nvGrpSpPr>
+        <p:cNvPr id="1" name="Shape 72"/>
+        <p:cNvGrpSpPr/>
+        <p:nvPr/>
+      </p:nvGrpSpPr>
+      <p:grpSpPr>
+        <a:xfrm>
+          <a:off x="0" y="0"/>
+          <a:ext cx="0" cy="0"/>
+          <a:chOff x="0" y="0"/>
+          <a:chExt cx="0" cy="0"/>
+        </a:xfrm>
+      </p:grpSpPr>
+      <p:sp>
+        <p:nvSpPr>
+          <p:cNvPr id="73" name="Google Shape;73;g35f391192_04:notes"/>
+          <p:cNvSpPr>
+            <a:spLocks noGrp="1" noRot="1" noChangeAspect="1"/>
+          </p:cNvSpPr>
+          <p:nvPr>
+            <p:ph type="sldImg" idx="2"/>
+          </p:nvPr>
+        </p:nvSpPr>
+        <p:spPr>
+          <a:xfrm>
+            <a:off x="381000" y="685800"/>
+            <a:ext cx="6096000" cy="3429000"/>
+          </a:xfrm>
+          <a:custGeom>
+            <a:avLst/>
+            <a:gdLst/>
+            <a:ahLst/>
+            <a:cxnLst/>
+            <a:rect l="l" t="t" r="r" b="b"/>
+            <a:pathLst>
+              <a:path w="120000" h="120000" extrusionOk="0">
+                <a:moveTo>
+                  <a:pt x="0" y="0"/>
+                </a:moveTo>
+                <a:lnTo>
+                  <a:pt x="120000" y="0"/>
+                </a:lnTo>
+                <a:lnTo>
+                  <a:pt x="120000" y="120000"/>
+                </a:lnTo>
+                <a:lnTo>
+                  <a:pt x="0" y="120000"/>
+                </a:lnTo>
+                <a:close/>
+              </a:path>
+            </a:pathLst>
+          </a:custGeom>
+        </p:spPr>
+      </p:sp>
+      <p:sp>
+        <p:nvSpPr>
+          <p:cNvPr id="74" name="Google Shape;74;g35f391192_04:notes"/>
+          <p:cNvSpPr txBox="1">
+            <a:spLocks noGrp="1"/>
+          </p:cNvSpPr>
+          <p:nvPr>
+            <p:ph type="body" idx="1"/>
+          </p:nvPr>
+        </p:nvSpPr>
+        <p:spPr>
+          <a:xfrm>
+            <a:off x="685800" y="4343400"/>
+            <a:ext cx="5486400" cy="4114800"/>
+          </a:xfrm>
+          <a:prstGeom prst="rect">
+            <a:avLst/>
+          </a:prstGeom>
+        </p:spPr>
+        <p:txBody>
+          <a:bodyPr spcFirstLastPara="1" wrap="square" lIns="91425" tIns="91425" rIns="91425" bIns="91425" anchor="t" anchorCtr="0">
+            <a:noAutofit/>
+          </a:bodyPr>
+          <a:lstStyle/>
+          <a:p>
+            <a:pPr marL="0" lvl="0" indent="0" algn="l" rtl="0">
+              <a:spcBef>
+                <a:spcPts val="0"/>
+              </a:spcBef>
+              <a:spcAft>
+                <a:spcPts val="0"/>
+              </a:spcAft>
+              <a:buNone/>
+            </a:pPr>
+            <a:endParaRPr/>
+          </a:p>
+        </p:txBody>
+      </p:sp>
+    </p:spTree>
+    <p:extLst>
+      <p:ext uri="{BB962C8B-B14F-4D97-AF65-F5344CB8AC3E}">
+        <p14:creationId xmlns:p14="http://schemas.microsoft.com/office/powerpoint/2010/main" val="2241319096"/>
+      </p:ext>
+    </p:extLst>
+  </p:cSld>
+  <p:clrMapOvr>
+    <a:masterClrMapping/>
+  </p:clrMapOvr>
+</p:notes>
+</file>
+
+<file path=ppt/notesSlides/notesSlide7.xml><?xml version="1.0" encoding="utf-8"?>
+<p:notes xmlns:a="http://schemas.openxmlformats.org/drawingml/2006/main" xmlns:r="http://schemas.openxmlformats.org/officeDocument/2006/relationships" xmlns:p="http://schemas.openxmlformats.org/presentationml/2006/main" showMasterSp="0" showMasterPhAnim="0">
+  <p:cSld>
+    <p:spTree>
+      <p:nvGrpSpPr>
         <p:cNvPr id="1" name="Shape 63"/>
         <p:cNvGrpSpPr/>
         <p:nvPr/>
@@ -5067,7 +5286,7 @@
 </p:notes>
 </file>
 
-<file path=ppt/notesSlides/notesSlide7.xml><?xml version="1.0" encoding="utf-8"?>
+<file path=ppt/notesSlides/notesSlide8.xml><?xml version="1.0" encoding="utf-8"?>
 <p:notes xmlns:a="http://schemas.openxmlformats.org/drawingml/2006/main" xmlns:r="http://schemas.openxmlformats.org/officeDocument/2006/relationships" xmlns:p="http://schemas.openxmlformats.org/presentationml/2006/main" showMasterSp="0" showMasterPhAnim="0">
   <p:cSld>
     <p:spTree>
@@ -5176,7 +5395,7 @@
 </p:notes>
 </file>
 
-<file path=ppt/notesSlides/notesSlide8.xml><?xml version="1.0" encoding="utf-8"?>
+<file path=ppt/notesSlides/notesSlide9.xml><?xml version="1.0" encoding="utf-8"?>
 <p:notes xmlns:a="http://schemas.openxmlformats.org/drawingml/2006/main" xmlns:r="http://schemas.openxmlformats.org/officeDocument/2006/relationships" xmlns:p="http://schemas.openxmlformats.org/presentationml/2006/main" showMasterSp="0" showMasterPhAnim="0">
   <p:cSld>
     <p:spTree>
@@ -5276,115 +5495,6 @@
     <p:extLst>
       <p:ext uri="{BB962C8B-B14F-4D97-AF65-F5344CB8AC3E}">
         <p14:creationId xmlns:p14="http://schemas.microsoft.com/office/powerpoint/2010/main" val="2742538494"/>
-      </p:ext>
-    </p:extLst>
-  </p:cSld>
-  <p:clrMapOvr>
-    <a:masterClrMapping/>
-  </p:clrMapOvr>
-</p:notes>
-</file>
-
-<file path=ppt/notesSlides/notesSlide9.xml><?xml version="1.0" encoding="utf-8"?>
-<p:notes xmlns:a="http://schemas.openxmlformats.org/drawingml/2006/main" xmlns:r="http://schemas.openxmlformats.org/officeDocument/2006/relationships" xmlns:p="http://schemas.openxmlformats.org/presentationml/2006/main" showMasterSp="0" showMasterPhAnim="0">
-  <p:cSld>
-    <p:spTree>
-      <p:nvGrpSpPr>
-        <p:cNvPr id="1" name="Shape 72"/>
-        <p:cNvGrpSpPr/>
-        <p:nvPr/>
-      </p:nvGrpSpPr>
-      <p:grpSpPr>
-        <a:xfrm>
-          <a:off x="0" y="0"/>
-          <a:ext cx="0" cy="0"/>
-          <a:chOff x="0" y="0"/>
-          <a:chExt cx="0" cy="0"/>
-        </a:xfrm>
-      </p:grpSpPr>
-      <p:sp>
-        <p:nvSpPr>
-          <p:cNvPr id="73" name="Google Shape;73;g35f391192_04:notes"/>
-          <p:cNvSpPr>
-            <a:spLocks noGrp="1" noRot="1" noChangeAspect="1"/>
-          </p:cNvSpPr>
-          <p:nvPr>
-            <p:ph type="sldImg" idx="2"/>
-          </p:nvPr>
-        </p:nvSpPr>
-        <p:spPr>
-          <a:xfrm>
-            <a:off x="381000" y="685800"/>
-            <a:ext cx="6096000" cy="3429000"/>
-          </a:xfrm>
-          <a:custGeom>
-            <a:avLst/>
-            <a:gdLst/>
-            <a:ahLst/>
-            <a:cxnLst/>
-            <a:rect l="l" t="t" r="r" b="b"/>
-            <a:pathLst>
-              <a:path w="120000" h="120000" extrusionOk="0">
-                <a:moveTo>
-                  <a:pt x="0" y="0"/>
-                </a:moveTo>
-                <a:lnTo>
-                  <a:pt x="120000" y="0"/>
-                </a:lnTo>
-                <a:lnTo>
-                  <a:pt x="120000" y="120000"/>
-                </a:lnTo>
-                <a:lnTo>
-                  <a:pt x="0" y="120000"/>
-                </a:lnTo>
-                <a:close/>
-              </a:path>
-            </a:pathLst>
-          </a:custGeom>
-        </p:spPr>
-      </p:sp>
-      <p:sp>
-        <p:nvSpPr>
-          <p:cNvPr id="74" name="Google Shape;74;g35f391192_04:notes"/>
-          <p:cNvSpPr txBox="1">
-            <a:spLocks noGrp="1"/>
-          </p:cNvSpPr>
-          <p:nvPr>
-            <p:ph type="body" idx="1"/>
-          </p:nvPr>
-        </p:nvSpPr>
-        <p:spPr>
-          <a:xfrm>
-            <a:off x="685800" y="4343400"/>
-            <a:ext cx="5486400" cy="4114800"/>
-          </a:xfrm>
-          <a:prstGeom prst="rect">
-            <a:avLst/>
-          </a:prstGeom>
-        </p:spPr>
-        <p:txBody>
-          <a:bodyPr spcFirstLastPara="1" wrap="square" lIns="91425" tIns="91425" rIns="91425" bIns="91425" anchor="t" anchorCtr="0">
-            <a:noAutofit/>
-          </a:bodyPr>
-          <a:lstStyle/>
-          <a:p>
-            <a:pPr marL="0" lvl="0" indent="0" algn="l" rtl="0">
-              <a:spcBef>
-                <a:spcPts val="0"/>
-              </a:spcBef>
-              <a:spcAft>
-                <a:spcPts val="0"/>
-              </a:spcAft>
-              <a:buNone/>
-            </a:pPr>
-            <a:endParaRPr/>
-          </a:p>
-        </p:txBody>
-      </p:sp>
-    </p:spTree>
-    <p:extLst>
-      <p:ext uri="{BB962C8B-B14F-4D97-AF65-F5344CB8AC3E}">
-        <p14:creationId xmlns:p14="http://schemas.microsoft.com/office/powerpoint/2010/main" val="1510877947"/>
       </p:ext>
     </p:extLst>
   </p:cSld>
@@ -5523,7 +5633,7 @@
           <a:p>
             <a:fld id="{6F13CEA5-4F51-4ED4-A676-F9C80F4D6128}" type="datetimeFigureOut">
               <a:rPr lang="he-IL" smtClean="0"/>
-              <a:t>כ"ב/תמוז/תשע"ט</a:t>
+              <a:t>כ"ג/תמוז/תשע"ט</a:t>
             </a:fld>
             <a:endParaRPr lang="he-IL"/>
           </a:p>
@@ -5691,7 +5801,7 @@
           <a:p>
             <a:fld id="{6F13CEA5-4F51-4ED4-A676-F9C80F4D6128}" type="datetimeFigureOut">
               <a:rPr lang="he-IL" smtClean="0"/>
-              <a:t>כ"ב/תמוז/תשע"ט</a:t>
+              <a:t>כ"ג/תמוז/תשע"ט</a:t>
             </a:fld>
             <a:endParaRPr lang="he-IL"/>
           </a:p>
@@ -5869,7 +5979,7 @@
           <a:p>
             <a:fld id="{6F13CEA5-4F51-4ED4-A676-F9C80F4D6128}" type="datetimeFigureOut">
               <a:rPr lang="he-IL" smtClean="0"/>
-              <a:t>כ"ב/תמוז/תשע"ט</a:t>
+              <a:t>כ"ג/תמוז/תשע"ט</a:t>
             </a:fld>
             <a:endParaRPr lang="he-IL"/>
           </a:p>
@@ -7059,7 +7169,7 @@
           <a:p>
             <a:fld id="{6F13CEA5-4F51-4ED4-A676-F9C80F4D6128}" type="datetimeFigureOut">
               <a:rPr lang="he-IL" smtClean="0"/>
-              <a:t>כ"ב/תמוז/תשע"ט</a:t>
+              <a:t>כ"ג/תמוז/תשע"ט</a:t>
             </a:fld>
             <a:endParaRPr lang="he-IL"/>
           </a:p>
@@ -7761,7 +7871,7 @@
           <a:p>
             <a:fld id="{6F13CEA5-4F51-4ED4-A676-F9C80F4D6128}" type="datetimeFigureOut">
               <a:rPr lang="he-IL" smtClean="0"/>
-              <a:t>כ"ב/תמוז/תשע"ט</a:t>
+              <a:t>כ"ג/תמוז/תשע"ט</a:t>
             </a:fld>
             <a:endParaRPr lang="he-IL"/>
           </a:p>
@@ -8006,7 +8116,7 @@
           <a:p>
             <a:fld id="{6F13CEA5-4F51-4ED4-A676-F9C80F4D6128}" type="datetimeFigureOut">
               <a:rPr lang="he-IL" smtClean="0"/>
-              <a:t>כ"ב/תמוז/תשע"ט</a:t>
+              <a:t>כ"ג/תמוז/תשע"ט</a:t>
             </a:fld>
             <a:endParaRPr lang="he-IL"/>
           </a:p>
@@ -8235,7 +8345,7 @@
           <a:p>
             <a:fld id="{6F13CEA5-4F51-4ED4-A676-F9C80F4D6128}" type="datetimeFigureOut">
               <a:rPr lang="he-IL" smtClean="0"/>
-              <a:t>כ"ב/תמוז/תשע"ט</a:t>
+              <a:t>כ"ג/תמוז/תשע"ט</a:t>
             </a:fld>
             <a:endParaRPr lang="he-IL"/>
           </a:p>
@@ -8599,7 +8709,7 @@
           <a:p>
             <a:fld id="{6F13CEA5-4F51-4ED4-A676-F9C80F4D6128}" type="datetimeFigureOut">
               <a:rPr lang="he-IL" smtClean="0"/>
-              <a:t>כ"ב/תמוז/תשע"ט</a:t>
+              <a:t>כ"ג/תמוז/תשע"ט</a:t>
             </a:fld>
             <a:endParaRPr lang="he-IL"/>
           </a:p>
@@ -8716,7 +8826,7 @@
           <a:p>
             <a:fld id="{6F13CEA5-4F51-4ED4-A676-F9C80F4D6128}" type="datetimeFigureOut">
               <a:rPr lang="he-IL" smtClean="0"/>
-              <a:t>כ"ב/תמוז/תשע"ט</a:t>
+              <a:t>כ"ג/תמוז/תשע"ט</a:t>
             </a:fld>
             <a:endParaRPr lang="he-IL"/>
           </a:p>
@@ -8811,7 +8921,7 @@
           <a:p>
             <a:fld id="{6F13CEA5-4F51-4ED4-A676-F9C80F4D6128}" type="datetimeFigureOut">
               <a:rPr lang="he-IL" smtClean="0"/>
-              <a:t>כ"ב/תמוז/תשע"ט</a:t>
+              <a:t>כ"ג/תמוז/תשע"ט</a:t>
             </a:fld>
             <a:endParaRPr lang="he-IL"/>
           </a:p>
@@ -9086,7 +9196,7 @@
           <a:p>
             <a:fld id="{6F13CEA5-4F51-4ED4-A676-F9C80F4D6128}" type="datetimeFigureOut">
               <a:rPr lang="he-IL" smtClean="0"/>
-              <a:t>כ"ב/תמוז/תשע"ט</a:t>
+              <a:t>כ"ג/תמוז/תשע"ט</a:t>
             </a:fld>
             <a:endParaRPr lang="he-IL"/>
           </a:p>
@@ -9338,7 +9448,7 @@
           <a:p>
             <a:fld id="{6F13CEA5-4F51-4ED4-A676-F9C80F4D6128}" type="datetimeFigureOut">
               <a:rPr lang="he-IL" smtClean="0"/>
-              <a:t>כ"ב/תמוז/תשע"ט</a:t>
+              <a:t>כ"ג/תמוז/תשע"ט</a:t>
             </a:fld>
             <a:endParaRPr lang="he-IL"/>
           </a:p>
@@ -9549,7 +9659,7 @@
           <a:p>
             <a:fld id="{6F13CEA5-4F51-4ED4-A676-F9C80F4D6128}" type="datetimeFigureOut">
               <a:rPr lang="he-IL" smtClean="0"/>
-              <a:t>כ"ב/תמוז/תשע"ט</a:t>
+              <a:t>כ"ג/תמוז/תשע"ט</a:t>
             </a:fld>
             <a:endParaRPr lang="he-IL"/>
           </a:p>
@@ -11499,6 +11609,964 @@
 <file path=ppt/slides/slide10.xml><?xml version="1.0" encoding="utf-8"?>
 <p:sld xmlns:a="http://schemas.openxmlformats.org/drawingml/2006/main" xmlns:r="http://schemas.openxmlformats.org/officeDocument/2006/relationships" xmlns:p="http://schemas.openxmlformats.org/presentationml/2006/main">
   <p:cSld>
+    <p:spTree>
+      <p:nvGrpSpPr>
+        <p:cNvPr id="1" name="Shape 66"/>
+        <p:cNvGrpSpPr/>
+        <p:nvPr/>
+      </p:nvGrpSpPr>
+      <p:grpSpPr>
+        <a:xfrm>
+          <a:off x="0" y="0"/>
+          <a:ext cx="0" cy="0"/>
+          <a:chOff x="0" y="0"/>
+          <a:chExt cx="0" cy="0"/>
+        </a:xfrm>
+      </p:grpSpPr>
+      <p:sp>
+        <p:nvSpPr>
+          <p:cNvPr id="68" name="Google Shape;68;p14"/>
+          <p:cNvSpPr txBox="1">
+            <a:spLocks noGrp="1"/>
+          </p:cNvSpPr>
+          <p:nvPr>
+            <p:ph type="body" idx="2"/>
+          </p:nvPr>
+        </p:nvSpPr>
+        <p:spPr>
+          <a:xfrm>
+            <a:off x="7797732" y="1473929"/>
+            <a:ext cx="3000400" cy="4720800"/>
+          </a:xfrm>
+          <a:prstGeom prst="rect">
+            <a:avLst/>
+          </a:prstGeom>
+        </p:spPr>
+        <p:txBody>
+          <a:bodyPr spcFirstLastPara="1" wrap="square" lIns="0" tIns="0" rIns="0" bIns="0" anchor="t" anchorCtr="0">
+            <a:noAutofit/>
+          </a:bodyPr>
+          <a:lstStyle/>
+          <a:p>
+            <a:pPr marL="285750" indent="-285750" algn="l" rtl="0">
+              <a:buFont typeface="Wingdings" panose="05000000000000000000" pitchFamily="2" charset="2"/>
+              <a:buChar char="v"/>
+            </a:pPr>
+            <a:r>
+              <a:rPr lang="en-US" sz="1600" b="1" dirty="0" err="1">
+                <a:latin typeface="BN Barak" panose="02000000000000000000" pitchFamily="2" charset="-79"/>
+                <a:cs typeface="BN Barak" panose="02000000000000000000" pitchFamily="2" charset="-79"/>
+              </a:rPr>
+              <a:t>Quartet.sol</a:t>
+            </a:r>
+            <a:endParaRPr lang="en-US" sz="1600" b="1" dirty="0">
+              <a:latin typeface="BN Barak" panose="02000000000000000000" pitchFamily="2" charset="-79"/>
+              <a:cs typeface="BN Barak" panose="02000000000000000000" pitchFamily="2" charset="-79"/>
+            </a:endParaRPr>
+          </a:p>
+          <a:p>
+            <a:pPr marL="285750" indent="-285750" algn="l" rtl="0">
+              <a:buFont typeface="Wingdings" panose="05000000000000000000" pitchFamily="2" charset="2"/>
+              <a:buChar char="v"/>
+            </a:pPr>
+            <a:r>
+              <a:rPr lang="en-US" sz="1600" b="1" dirty="0" err="1">
+                <a:latin typeface="BN Barak" panose="02000000000000000000" pitchFamily="2" charset="-79"/>
+                <a:cs typeface="BN Barak" panose="02000000000000000000" pitchFamily="2" charset="-79"/>
+              </a:rPr>
+              <a:t>Card.sol</a:t>
+            </a:r>
+            <a:endParaRPr lang="en-US" sz="1600" b="1" dirty="0">
+              <a:latin typeface="BN Barak" panose="02000000000000000000" pitchFamily="2" charset="-79"/>
+              <a:cs typeface="BN Barak" panose="02000000000000000000" pitchFamily="2" charset="-79"/>
+            </a:endParaRPr>
+          </a:p>
+          <a:p>
+            <a:pPr marL="285750" indent="-285750" algn="l" rtl="0">
+              <a:buFont typeface="Wingdings" panose="05000000000000000000" pitchFamily="2" charset="2"/>
+              <a:buChar char="v"/>
+            </a:pPr>
+            <a:r>
+              <a:rPr lang="en-US" sz="1600" b="1" dirty="0" err="1">
+                <a:latin typeface="BN Barak" panose="02000000000000000000" pitchFamily="2" charset="-79"/>
+                <a:cs typeface="BN Barak" panose="02000000000000000000" pitchFamily="2" charset="-79"/>
+              </a:rPr>
+              <a:t>QuartetCoin.sol</a:t>
+            </a:r>
+            <a:endParaRPr lang="en-US" sz="1600" b="1" dirty="0">
+              <a:latin typeface="BN Barak" panose="02000000000000000000" pitchFamily="2" charset="-79"/>
+              <a:cs typeface="BN Barak" panose="02000000000000000000" pitchFamily="2" charset="-79"/>
+            </a:endParaRPr>
+          </a:p>
+          <a:p>
+            <a:pPr marL="285750" indent="-285750" algn="l" rtl="0">
+              <a:buFont typeface="Wingdings" panose="05000000000000000000" pitchFamily="2" charset="2"/>
+              <a:buChar char="v"/>
+            </a:pPr>
+            <a:endParaRPr lang="en-US" sz="1600" b="1" dirty="0">
+              <a:latin typeface="BN Barak" panose="02000000000000000000" pitchFamily="2" charset="-79"/>
+              <a:cs typeface="BN Barak" panose="02000000000000000000" pitchFamily="2" charset="-79"/>
+            </a:endParaRPr>
+          </a:p>
+          <a:p>
+            <a:pPr marL="285750" indent="-285750" algn="l" rtl="0">
+              <a:buFont typeface="Wingdings" panose="05000000000000000000" pitchFamily="2" charset="2"/>
+              <a:buChar char="v"/>
+            </a:pPr>
+            <a:endParaRPr sz="1600" b="1" dirty="0">
+              <a:latin typeface="BN Barak" panose="02000000000000000000" pitchFamily="2" charset="-79"/>
+              <a:cs typeface="BN Barak" panose="02000000000000000000" pitchFamily="2" charset="-79"/>
+            </a:endParaRPr>
+          </a:p>
+        </p:txBody>
+      </p:sp>
+      <p:sp>
+        <p:nvSpPr>
+          <p:cNvPr id="71" name="Google Shape;71;p14"/>
+          <p:cNvSpPr txBox="1">
+            <a:spLocks noGrp="1"/>
+          </p:cNvSpPr>
+          <p:nvPr>
+            <p:ph type="sldNum" idx="12"/>
+          </p:nvPr>
+        </p:nvSpPr>
+        <p:spPr>
+          <a:xfrm>
+            <a:off x="11307445" y="6333135"/>
+            <a:ext cx="731600" cy="524800"/>
+          </a:xfrm>
+          <a:prstGeom prst="rect">
+            <a:avLst/>
+          </a:prstGeom>
+        </p:spPr>
+        <p:txBody>
+          <a:bodyPr spcFirstLastPara="1" wrap="square" lIns="0" tIns="0" rIns="0" bIns="0" anchor="ctr" anchorCtr="0">
+            <a:noAutofit/>
+          </a:bodyPr>
+          <a:lstStyle/>
+          <a:p>
+            <a:pPr>
+              <a:buSzPts val="1100"/>
+            </a:pPr>
+            <a:fld id="{00000000-1234-1234-1234-123412341234}" type="slidenum">
+              <a:rPr lang="en"/>
+              <a:pPr>
+                <a:buSzPts val="1100"/>
+              </a:pPr>
+              <a:t>10</a:t>
+            </a:fld>
+            <a:endParaRPr/>
+          </a:p>
+        </p:txBody>
+      </p:sp>
+      <p:sp>
+        <p:nvSpPr>
+          <p:cNvPr id="9" name="Google Shape;62;p13"/>
+          <p:cNvSpPr txBox="1">
+            <a:spLocks/>
+          </p:cNvSpPr>
+          <p:nvPr/>
+        </p:nvSpPr>
+        <p:spPr>
+          <a:xfrm>
+            <a:off x="-730606" y="1249076"/>
+            <a:ext cx="6053200" cy="3822493"/>
+          </a:xfrm>
+          <a:prstGeom prst="rect">
+            <a:avLst/>
+          </a:prstGeom>
+        </p:spPr>
+        <p:txBody>
+          <a:bodyPr spcFirstLastPara="1" vert="horz" wrap="square" lIns="0" tIns="0" rIns="0" bIns="0" rtlCol="1" anchor="ctr" anchorCtr="0">
+            <a:noAutofit/>
+          </a:bodyPr>
+          <a:lstStyle>
+            <a:lvl1pPr lvl="0" algn="r" defTabSz="914400" rtl="1" eaLnBrk="1" latinLnBrk="0" hangingPunct="1">
+              <a:lnSpc>
+                <a:spcPct val="90000"/>
+              </a:lnSpc>
+              <a:spcBef>
+                <a:spcPts val="0"/>
+              </a:spcBef>
+              <a:spcAft>
+                <a:spcPts val="0"/>
+              </a:spcAft>
+              <a:buSzPts val="2600"/>
+              <a:buNone/>
+              <a:defRPr sz="4400" kern="1200">
+                <a:solidFill>
+                  <a:schemeClr val="tx1"/>
+                </a:solidFill>
+                <a:latin typeface="+mj-lt"/>
+                <a:ea typeface="+mj-ea"/>
+                <a:cs typeface="+mj-cs"/>
+              </a:defRPr>
+            </a:lvl1pPr>
+            <a:lvl2pPr lvl="1">
+              <a:spcBef>
+                <a:spcPts val="0"/>
+              </a:spcBef>
+              <a:spcAft>
+                <a:spcPts val="0"/>
+              </a:spcAft>
+              <a:buSzPts val="2600"/>
+              <a:buNone/>
+              <a:defRPr/>
+            </a:lvl2pPr>
+            <a:lvl3pPr lvl="2">
+              <a:spcBef>
+                <a:spcPts val="0"/>
+              </a:spcBef>
+              <a:spcAft>
+                <a:spcPts val="0"/>
+              </a:spcAft>
+              <a:buSzPts val="2600"/>
+              <a:buNone/>
+              <a:defRPr/>
+            </a:lvl3pPr>
+            <a:lvl4pPr lvl="3">
+              <a:spcBef>
+                <a:spcPts val="0"/>
+              </a:spcBef>
+              <a:spcAft>
+                <a:spcPts val="0"/>
+              </a:spcAft>
+              <a:buSzPts val="2600"/>
+              <a:buNone/>
+              <a:defRPr/>
+            </a:lvl4pPr>
+            <a:lvl5pPr lvl="4">
+              <a:spcBef>
+                <a:spcPts val="0"/>
+              </a:spcBef>
+              <a:spcAft>
+                <a:spcPts val="0"/>
+              </a:spcAft>
+              <a:buSzPts val="2600"/>
+              <a:buNone/>
+              <a:defRPr/>
+            </a:lvl5pPr>
+            <a:lvl6pPr lvl="5">
+              <a:spcBef>
+                <a:spcPts val="0"/>
+              </a:spcBef>
+              <a:spcAft>
+                <a:spcPts val="0"/>
+              </a:spcAft>
+              <a:buSzPts val="2600"/>
+              <a:buNone/>
+              <a:defRPr/>
+            </a:lvl6pPr>
+            <a:lvl7pPr lvl="6">
+              <a:spcBef>
+                <a:spcPts val="0"/>
+              </a:spcBef>
+              <a:spcAft>
+                <a:spcPts val="0"/>
+              </a:spcAft>
+              <a:buSzPts val="2600"/>
+              <a:buNone/>
+              <a:defRPr/>
+            </a:lvl7pPr>
+            <a:lvl8pPr lvl="7">
+              <a:spcBef>
+                <a:spcPts val="0"/>
+              </a:spcBef>
+              <a:spcAft>
+                <a:spcPts val="0"/>
+              </a:spcAft>
+              <a:buSzPts val="2600"/>
+              <a:buNone/>
+              <a:defRPr/>
+            </a:lvl8pPr>
+            <a:lvl9pPr lvl="8">
+              <a:spcBef>
+                <a:spcPts val="0"/>
+              </a:spcBef>
+              <a:spcAft>
+                <a:spcPts val="0"/>
+              </a:spcAft>
+              <a:buSzPts val="2600"/>
+              <a:buNone/>
+              <a:defRPr/>
+            </a:lvl9pPr>
+          </a:lstStyle>
+          <a:p>
+            <a:pPr algn="ctr" rtl="0"/>
+            <a:r>
+              <a:rPr lang="en-US" b="1" dirty="0">
+                <a:latin typeface="Buxton Sketch" panose="03080500000500000004" pitchFamily="66" charset="0"/>
+                <a:cs typeface="BN Barak" panose="02000000000000000000" pitchFamily="2" charset="-79"/>
+              </a:rPr>
+              <a:t>Contracts</a:t>
+            </a:r>
+            <a:endParaRPr lang="en-US" sz="2000" dirty="0">
+              <a:latin typeface="Tempus Sans ITC" panose="04020404030D07020202" pitchFamily="82" charset="0"/>
+              <a:cs typeface="BN Barak" panose="02000000000000000000" pitchFamily="2" charset="-79"/>
+            </a:endParaRPr>
+          </a:p>
+        </p:txBody>
+      </p:sp>
+      <p:pic>
+        <p:nvPicPr>
+          <p:cNvPr id="2050" name="Picture 2" descr="×ª××¦××ª ×ª××× × ×¢×××¨ âªcontractâ¬â"/>
+          <p:cNvPicPr>
+            <a:picLocks noChangeAspect="1" noChangeArrowheads="1"/>
+          </p:cNvPicPr>
+          <p:nvPr/>
+        </p:nvPicPr>
+        <p:blipFill>
+          <a:blip r:embed="rId3">
+            <a:extLst>
+              <a:ext uri="{28A0092B-C50C-407E-A947-70E740481C1C}">
+                <a14:useLocalDpi xmlns:a14="http://schemas.microsoft.com/office/drawing/2010/main" val="0"/>
+              </a:ext>
+            </a:extLst>
+          </a:blip>
+          <a:srcRect/>
+          <a:stretch>
+            <a:fillRect/>
+          </a:stretch>
+        </p:blipFill>
+        <p:spPr bwMode="auto">
+          <a:xfrm>
+            <a:off x="1744532" y="3732551"/>
+            <a:ext cx="1078302" cy="1078302"/>
+          </a:xfrm>
+          <a:prstGeom prst="rect">
+            <a:avLst/>
+          </a:prstGeom>
+          <a:noFill/>
+          <a:extLst>
+            <a:ext uri="{909E8E84-426E-40DD-AFC4-6F175D3DCCD1}">
+              <a14:hiddenFill xmlns:a14="http://schemas.microsoft.com/office/drawing/2010/main">
+                <a:solidFill>
+                  <a:srgbClr val="FFFFFF"/>
+                </a:solidFill>
+              </a14:hiddenFill>
+            </a:ext>
+          </a:extLst>
+        </p:spPr>
+      </p:pic>
+    </p:spTree>
+    <p:extLst>
+      <p:ext uri="{BB962C8B-B14F-4D97-AF65-F5344CB8AC3E}">
+        <p14:creationId xmlns:p14="http://schemas.microsoft.com/office/powerpoint/2010/main" val="3224061407"/>
+      </p:ext>
+    </p:extLst>
+  </p:cSld>
+  <p:clrMapOvr>
+    <a:masterClrMapping/>
+  </p:clrMapOvr>
+</p:sld>
+</file>
+
+<file path=ppt/slides/slide11.xml><?xml version="1.0" encoding="utf-8"?>
+<p:sld xmlns:a="http://schemas.openxmlformats.org/drawingml/2006/main" xmlns:r="http://schemas.openxmlformats.org/officeDocument/2006/relationships" xmlns:p="http://schemas.openxmlformats.org/presentationml/2006/main">
+  <p:cSld>
+    <p:bg>
+      <p:bgPr>
+        <a:gradFill>
+          <a:gsLst>
+            <a:gs pos="0">
+              <a:srgbClr val="46E180"/>
+            </a:gs>
+            <a:gs pos="100000">
+              <a:srgbClr val="B8DF32"/>
+            </a:gs>
+          </a:gsLst>
+          <a:lin ang="5400012" scaled="0"/>
+        </a:gradFill>
+        <a:effectLst/>
+      </p:bgPr>
+    </p:bg>
+    <p:spTree>
+      <p:nvGrpSpPr>
+        <p:cNvPr id="1" name="Shape 75"/>
+        <p:cNvGrpSpPr/>
+        <p:nvPr/>
+      </p:nvGrpSpPr>
+      <p:grpSpPr>
+        <a:xfrm>
+          <a:off x="0" y="0"/>
+          <a:ext cx="0" cy="0"/>
+          <a:chOff x="0" y="0"/>
+          <a:chExt cx="0" cy="0"/>
+        </a:xfrm>
+      </p:grpSpPr>
+      <p:sp>
+        <p:nvSpPr>
+          <p:cNvPr id="79" name="Google Shape;79;p15"/>
+          <p:cNvSpPr txBox="1">
+            <a:spLocks noGrp="1"/>
+          </p:cNvSpPr>
+          <p:nvPr>
+            <p:ph type="sldNum" idx="12"/>
+          </p:nvPr>
+        </p:nvSpPr>
+        <p:spPr>
+          <a:prstGeom prst="rect">
+            <a:avLst/>
+          </a:prstGeom>
+        </p:spPr>
+        <p:txBody>
+          <a:bodyPr spcFirstLastPara="1" wrap="square" lIns="0" tIns="0" rIns="0" bIns="0" anchor="ctr" anchorCtr="0">
+            <a:noAutofit/>
+          </a:bodyPr>
+          <a:lstStyle/>
+          <a:p>
+            <a:fld id="{00000000-1234-1234-1234-123412341234}" type="slidenum">
+              <a:rPr lang="en"/>
+              <a:pPr/>
+              <a:t>11</a:t>
+            </a:fld>
+            <a:endParaRPr/>
+          </a:p>
+        </p:txBody>
+      </p:sp>
+      <p:sp>
+        <p:nvSpPr>
+          <p:cNvPr id="18" name="Google Shape;270;p34"/>
+          <p:cNvSpPr/>
+          <p:nvPr/>
+        </p:nvSpPr>
+        <p:spPr>
+          <a:xfrm>
+            <a:off x="5373601" y="1535610"/>
+            <a:ext cx="5140196" cy="4001701"/>
+          </a:xfrm>
+          <a:custGeom>
+            <a:avLst/>
+            <a:gdLst/>
+            <a:ahLst/>
+            <a:cxnLst/>
+            <a:rect l="l" t="t" r="r" b="b"/>
+            <a:pathLst>
+              <a:path w="143434" h="111665" extrusionOk="0">
+                <a:moveTo>
+                  <a:pt x="71751" y="2308"/>
+                </a:moveTo>
+                <a:lnTo>
+                  <a:pt x="71887" y="2376"/>
+                </a:lnTo>
+                <a:lnTo>
+                  <a:pt x="72091" y="2444"/>
+                </a:lnTo>
+                <a:lnTo>
+                  <a:pt x="72159" y="2647"/>
+                </a:lnTo>
+                <a:lnTo>
+                  <a:pt x="72226" y="2783"/>
+                </a:lnTo>
+                <a:lnTo>
+                  <a:pt x="72159" y="2987"/>
+                </a:lnTo>
+                <a:lnTo>
+                  <a:pt x="72091" y="3190"/>
+                </a:lnTo>
+                <a:lnTo>
+                  <a:pt x="71887" y="3258"/>
+                </a:lnTo>
+                <a:lnTo>
+                  <a:pt x="71751" y="3326"/>
+                </a:lnTo>
+                <a:lnTo>
+                  <a:pt x="71548" y="3258"/>
+                </a:lnTo>
+                <a:lnTo>
+                  <a:pt x="71344" y="3190"/>
+                </a:lnTo>
+                <a:lnTo>
+                  <a:pt x="71276" y="2987"/>
+                </a:lnTo>
+                <a:lnTo>
+                  <a:pt x="71208" y="2783"/>
+                </a:lnTo>
+                <a:lnTo>
+                  <a:pt x="71276" y="2647"/>
+                </a:lnTo>
+                <a:lnTo>
+                  <a:pt x="71344" y="2444"/>
+                </a:lnTo>
+                <a:lnTo>
+                  <a:pt x="71548" y="2376"/>
+                </a:lnTo>
+                <a:lnTo>
+                  <a:pt x="71751" y="2308"/>
+                </a:lnTo>
+                <a:close/>
+                <a:moveTo>
+                  <a:pt x="137528" y="5906"/>
+                </a:moveTo>
+                <a:lnTo>
+                  <a:pt x="137596" y="5974"/>
+                </a:lnTo>
+                <a:lnTo>
+                  <a:pt x="137596" y="89604"/>
+                </a:lnTo>
+                <a:lnTo>
+                  <a:pt x="5906" y="89604"/>
+                </a:lnTo>
+                <a:lnTo>
+                  <a:pt x="5906" y="5974"/>
+                </a:lnTo>
+                <a:lnTo>
+                  <a:pt x="5906" y="5906"/>
+                </a:lnTo>
+                <a:close/>
+                <a:moveTo>
+                  <a:pt x="3530" y="0"/>
+                </a:moveTo>
+                <a:lnTo>
+                  <a:pt x="3191" y="68"/>
+                </a:lnTo>
+                <a:lnTo>
+                  <a:pt x="2444" y="339"/>
+                </a:lnTo>
+                <a:lnTo>
+                  <a:pt x="1766" y="679"/>
+                </a:lnTo>
+                <a:lnTo>
+                  <a:pt x="1155" y="1154"/>
+                </a:lnTo>
+                <a:lnTo>
+                  <a:pt x="679" y="1765"/>
+                </a:lnTo>
+                <a:lnTo>
+                  <a:pt x="272" y="2444"/>
+                </a:lnTo>
+                <a:lnTo>
+                  <a:pt x="69" y="3190"/>
+                </a:lnTo>
+                <a:lnTo>
+                  <a:pt x="1" y="3598"/>
+                </a:lnTo>
+                <a:lnTo>
+                  <a:pt x="1" y="4005"/>
+                </a:lnTo>
+                <a:lnTo>
+                  <a:pt x="1" y="91572"/>
+                </a:lnTo>
+                <a:lnTo>
+                  <a:pt x="1" y="91979"/>
+                </a:lnTo>
+                <a:lnTo>
+                  <a:pt x="69" y="92319"/>
+                </a:lnTo>
+                <a:lnTo>
+                  <a:pt x="272" y="93065"/>
+                </a:lnTo>
+                <a:lnTo>
+                  <a:pt x="679" y="93744"/>
+                </a:lnTo>
+                <a:lnTo>
+                  <a:pt x="1155" y="94355"/>
+                </a:lnTo>
+                <a:lnTo>
+                  <a:pt x="1766" y="94830"/>
+                </a:lnTo>
+                <a:lnTo>
+                  <a:pt x="2444" y="95238"/>
+                </a:lnTo>
+                <a:lnTo>
+                  <a:pt x="3191" y="95441"/>
+                </a:lnTo>
+                <a:lnTo>
+                  <a:pt x="3530" y="95509"/>
+                </a:lnTo>
+                <a:lnTo>
+                  <a:pt x="139904" y="95509"/>
+                </a:lnTo>
+                <a:lnTo>
+                  <a:pt x="140311" y="95441"/>
+                </a:lnTo>
+                <a:lnTo>
+                  <a:pt x="141058" y="95238"/>
+                </a:lnTo>
+                <a:lnTo>
+                  <a:pt x="141737" y="94830"/>
+                </a:lnTo>
+                <a:lnTo>
+                  <a:pt x="142280" y="94355"/>
+                </a:lnTo>
+                <a:lnTo>
+                  <a:pt x="142755" y="93744"/>
+                </a:lnTo>
+                <a:lnTo>
+                  <a:pt x="143162" y="93065"/>
+                </a:lnTo>
+                <a:lnTo>
+                  <a:pt x="143366" y="92319"/>
+                </a:lnTo>
+                <a:lnTo>
+                  <a:pt x="143434" y="91979"/>
+                </a:lnTo>
+                <a:lnTo>
+                  <a:pt x="143434" y="91572"/>
+                </a:lnTo>
+                <a:lnTo>
+                  <a:pt x="143434" y="4005"/>
+                </a:lnTo>
+                <a:lnTo>
+                  <a:pt x="143434" y="3598"/>
+                </a:lnTo>
+                <a:lnTo>
+                  <a:pt x="143366" y="3190"/>
+                </a:lnTo>
+                <a:lnTo>
+                  <a:pt x="143162" y="2444"/>
+                </a:lnTo>
+                <a:lnTo>
+                  <a:pt x="142755" y="1765"/>
+                </a:lnTo>
+                <a:lnTo>
+                  <a:pt x="142280" y="1154"/>
+                </a:lnTo>
+                <a:lnTo>
+                  <a:pt x="141737" y="679"/>
+                </a:lnTo>
+                <a:lnTo>
+                  <a:pt x="141058" y="339"/>
+                </a:lnTo>
+                <a:lnTo>
+                  <a:pt x="140311" y="68"/>
+                </a:lnTo>
+                <a:lnTo>
+                  <a:pt x="139904" y="0"/>
+                </a:lnTo>
+                <a:close/>
+                <a:moveTo>
+                  <a:pt x="55324" y="95713"/>
+                </a:moveTo>
+                <a:lnTo>
+                  <a:pt x="55052" y="98971"/>
+                </a:lnTo>
+                <a:lnTo>
+                  <a:pt x="54713" y="102297"/>
+                </a:lnTo>
+                <a:lnTo>
+                  <a:pt x="54374" y="105284"/>
+                </a:lnTo>
+                <a:lnTo>
+                  <a:pt x="53966" y="107388"/>
+                </a:lnTo>
+                <a:lnTo>
+                  <a:pt x="53763" y="108203"/>
+                </a:lnTo>
+                <a:lnTo>
+                  <a:pt x="53627" y="108746"/>
+                </a:lnTo>
+                <a:lnTo>
+                  <a:pt x="53423" y="109153"/>
+                </a:lnTo>
+                <a:lnTo>
+                  <a:pt x="53220" y="109357"/>
+                </a:lnTo>
+                <a:lnTo>
+                  <a:pt x="52677" y="109493"/>
+                </a:lnTo>
+                <a:lnTo>
+                  <a:pt x="51794" y="109696"/>
+                </a:lnTo>
+                <a:lnTo>
+                  <a:pt x="49690" y="110036"/>
+                </a:lnTo>
+                <a:lnTo>
+                  <a:pt x="48061" y="110307"/>
+                </a:lnTo>
+                <a:lnTo>
+                  <a:pt x="47450" y="110443"/>
+                </a:lnTo>
+                <a:lnTo>
+                  <a:pt x="47110" y="110511"/>
+                </a:lnTo>
+                <a:lnTo>
+                  <a:pt x="47042" y="110579"/>
+                </a:lnTo>
+                <a:lnTo>
+                  <a:pt x="47042" y="110783"/>
+                </a:lnTo>
+                <a:lnTo>
+                  <a:pt x="47110" y="110850"/>
+                </a:lnTo>
+                <a:lnTo>
+                  <a:pt x="47585" y="110918"/>
+                </a:lnTo>
+                <a:lnTo>
+                  <a:pt x="48400" y="110986"/>
+                </a:lnTo>
+                <a:lnTo>
+                  <a:pt x="51387" y="111054"/>
+                </a:lnTo>
+                <a:lnTo>
+                  <a:pt x="56071" y="111122"/>
+                </a:lnTo>
+                <a:lnTo>
+                  <a:pt x="87092" y="111122"/>
+                </a:lnTo>
+                <a:lnTo>
+                  <a:pt x="91708" y="111054"/>
+                </a:lnTo>
+                <a:lnTo>
+                  <a:pt x="94695" y="110986"/>
+                </a:lnTo>
+                <a:lnTo>
+                  <a:pt x="95578" y="110918"/>
+                </a:lnTo>
+                <a:lnTo>
+                  <a:pt x="96053" y="110850"/>
+                </a:lnTo>
+                <a:lnTo>
+                  <a:pt x="96121" y="110783"/>
+                </a:lnTo>
+                <a:lnTo>
+                  <a:pt x="96121" y="110579"/>
+                </a:lnTo>
+                <a:lnTo>
+                  <a:pt x="96053" y="110511"/>
+                </a:lnTo>
+                <a:lnTo>
+                  <a:pt x="95713" y="110443"/>
+                </a:lnTo>
+                <a:lnTo>
+                  <a:pt x="95102" y="110307"/>
+                </a:lnTo>
+                <a:lnTo>
+                  <a:pt x="93473" y="110036"/>
+                </a:lnTo>
+                <a:lnTo>
+                  <a:pt x="91369" y="109696"/>
+                </a:lnTo>
+                <a:lnTo>
+                  <a:pt x="90487" y="109493"/>
+                </a:lnTo>
+                <a:lnTo>
+                  <a:pt x="89943" y="109357"/>
+                </a:lnTo>
+                <a:lnTo>
+                  <a:pt x="89740" y="109153"/>
+                </a:lnTo>
+                <a:lnTo>
+                  <a:pt x="89536" y="108746"/>
+                </a:lnTo>
+                <a:lnTo>
+                  <a:pt x="89333" y="108203"/>
+                </a:lnTo>
+                <a:lnTo>
+                  <a:pt x="89197" y="107388"/>
+                </a:lnTo>
+                <a:lnTo>
+                  <a:pt x="88789" y="105284"/>
+                </a:lnTo>
+                <a:lnTo>
+                  <a:pt x="88382" y="102297"/>
+                </a:lnTo>
+                <a:lnTo>
+                  <a:pt x="88043" y="98971"/>
+                </a:lnTo>
+                <a:lnTo>
+                  <a:pt x="87839" y="95713"/>
+                </a:lnTo>
+                <a:close/>
+                <a:moveTo>
+                  <a:pt x="47450" y="111054"/>
+                </a:moveTo>
+                <a:lnTo>
+                  <a:pt x="47450" y="111122"/>
+                </a:lnTo>
+                <a:lnTo>
+                  <a:pt x="47450" y="111393"/>
+                </a:lnTo>
+                <a:lnTo>
+                  <a:pt x="47518" y="111461"/>
+                </a:lnTo>
+                <a:lnTo>
+                  <a:pt x="48807" y="111529"/>
+                </a:lnTo>
+                <a:lnTo>
+                  <a:pt x="52473" y="111597"/>
+                </a:lnTo>
+                <a:lnTo>
+                  <a:pt x="62384" y="111665"/>
+                </a:lnTo>
+                <a:lnTo>
+                  <a:pt x="80779" y="111665"/>
+                </a:lnTo>
+                <a:lnTo>
+                  <a:pt x="90622" y="111597"/>
+                </a:lnTo>
+                <a:lnTo>
+                  <a:pt x="94356" y="111529"/>
+                </a:lnTo>
+                <a:lnTo>
+                  <a:pt x="95646" y="111461"/>
+                </a:lnTo>
+                <a:lnTo>
+                  <a:pt x="95713" y="111393"/>
+                </a:lnTo>
+                <a:lnTo>
+                  <a:pt x="95713" y="111122"/>
+                </a:lnTo>
+                <a:lnTo>
+                  <a:pt x="95646" y="111054"/>
+                </a:lnTo>
+                <a:lnTo>
+                  <a:pt x="94084" y="111122"/>
+                </a:lnTo>
+                <a:lnTo>
+                  <a:pt x="91233" y="111190"/>
+                </a:lnTo>
+                <a:lnTo>
+                  <a:pt x="80847" y="111258"/>
+                </a:lnTo>
+                <a:lnTo>
+                  <a:pt x="62316" y="111258"/>
+                </a:lnTo>
+                <a:lnTo>
+                  <a:pt x="51930" y="111190"/>
+                </a:lnTo>
+                <a:lnTo>
+                  <a:pt x="49079" y="111122"/>
+                </a:lnTo>
+                <a:lnTo>
+                  <a:pt x="47518" y="111054"/>
+                </a:lnTo>
+                <a:close/>
+              </a:path>
+            </a:pathLst>
+          </a:custGeom>
+          <a:solidFill>
+            <a:srgbClr val="FFFFFF"/>
+          </a:solidFill>
+          <a:ln>
+            <a:noFill/>
+          </a:ln>
+        </p:spPr>
+        <p:txBody>
+          <a:bodyPr spcFirstLastPara="1" wrap="square" lIns="121900" tIns="121900" rIns="121900" bIns="121900" anchor="ctr" anchorCtr="0">
+            <a:noAutofit/>
+          </a:bodyPr>
+          <a:lstStyle/>
+          <a:p>
+            <a:pPr algn="l" rtl="0">
+              <a:buClr>
+                <a:srgbClr val="000000"/>
+              </a:buClr>
+              <a:buFont typeface="Arial"/>
+              <a:buNone/>
+            </a:pPr>
+            <a:endParaRPr sz="1867" kern="0">
+              <a:solidFill>
+                <a:srgbClr val="000000"/>
+              </a:solidFill>
+              <a:cs typeface="Arial"/>
+              <a:sym typeface="Arial"/>
+            </a:endParaRPr>
+          </a:p>
+        </p:txBody>
+      </p:sp>
+      <p:pic>
+        <p:nvPicPr>
+          <p:cNvPr id="2" name="תמונה 1"/>
+          <p:cNvPicPr>
+            <a:picLocks noChangeAspect="1"/>
+          </p:cNvPicPr>
+          <p:nvPr/>
+        </p:nvPicPr>
+        <p:blipFill>
+          <a:blip r:embed="rId3"/>
+          <a:stretch>
+            <a:fillRect/>
+          </a:stretch>
+        </p:blipFill>
+        <p:spPr>
+          <a:xfrm>
+            <a:off x="5583836" y="1747438"/>
+            <a:ext cx="4721901" cy="3011939"/>
+          </a:xfrm>
+          <a:prstGeom prst="rect">
+            <a:avLst/>
+          </a:prstGeom>
+        </p:spPr>
+      </p:pic>
+      <p:sp>
+        <p:nvSpPr>
+          <p:cNvPr id="20" name="TextBox 19"/>
+          <p:cNvSpPr txBox="1"/>
+          <p:nvPr/>
+        </p:nvSpPr>
+        <p:spPr>
+          <a:xfrm>
+            <a:off x="1543988" y="2008665"/>
+            <a:ext cx="3320321" cy="2677656"/>
+          </a:xfrm>
+          <a:prstGeom prst="rect">
+            <a:avLst/>
+          </a:prstGeom>
+          <a:noFill/>
+        </p:spPr>
+        <p:txBody>
+          <a:bodyPr wrap="square" rtlCol="1">
+            <a:spAutoFit/>
+          </a:bodyPr>
+          <a:lstStyle/>
+          <a:p>
+            <a:pPr algn="l" rtl="0"/>
+            <a:r>
+              <a:rPr lang="en-US" sz="2800" dirty="0" err="1">
+                <a:solidFill>
+                  <a:schemeClr val="accent2">
+                    <a:lumMod val="20000"/>
+                    <a:lumOff val="80000"/>
+                  </a:schemeClr>
+                </a:solidFill>
+                <a:latin typeface="Microsoft YaHei UI Light" panose="020B0502040204020203" pitchFamily="34" charset="-122"/>
+                <a:ea typeface="Microsoft YaHei UI Light" panose="020B0502040204020203" pitchFamily="34" charset="-122"/>
+              </a:rPr>
+              <a:t>Quartet.sol</a:t>
+            </a:r>
+            <a:r>
+              <a:rPr lang="en-US" sz="2800" dirty="0">
+                <a:solidFill>
+                  <a:schemeClr val="accent2">
+                    <a:lumMod val="20000"/>
+                    <a:lumOff val="80000"/>
+                  </a:schemeClr>
+                </a:solidFill>
+                <a:latin typeface="Microsoft YaHei UI Light" panose="020B0502040204020203" pitchFamily="34" charset="-122"/>
+                <a:ea typeface="Microsoft YaHei UI Light" panose="020B0502040204020203" pitchFamily="34" charset="-122"/>
+              </a:rPr>
+              <a:t> is the main contract – the main that is being called according to user choices in the game. </a:t>
+            </a:r>
+            <a:endParaRPr lang="he-IL" sz="2800" dirty="0">
+              <a:solidFill>
+                <a:schemeClr val="accent2">
+                  <a:lumMod val="20000"/>
+                  <a:lumOff val="80000"/>
+                </a:schemeClr>
+              </a:solidFill>
+              <a:latin typeface="Microsoft YaHei UI Light" panose="020B0502040204020203" pitchFamily="34" charset="-122"/>
+              <a:ea typeface="Microsoft YaHei UI Light" panose="020B0502040204020203" pitchFamily="34" charset="-122"/>
+            </a:endParaRPr>
+          </a:p>
+        </p:txBody>
+      </p:sp>
+    </p:spTree>
+    <p:extLst>
+      <p:ext uri="{BB962C8B-B14F-4D97-AF65-F5344CB8AC3E}">
+        <p14:creationId xmlns:p14="http://schemas.microsoft.com/office/powerpoint/2010/main" val="722688037"/>
+      </p:ext>
+    </p:extLst>
+  </p:cSld>
+  <p:clrMapOvr>
+    <a:masterClrMapping/>
+  </p:clrMapOvr>
+</p:sld>
+</file>
+
+<file path=ppt/slides/slide12.xml><?xml version="1.0" encoding="utf-8"?>
+<p:sld xmlns:a="http://schemas.openxmlformats.org/drawingml/2006/main" xmlns:r="http://schemas.openxmlformats.org/officeDocument/2006/relationships" xmlns:p="http://schemas.openxmlformats.org/presentationml/2006/main">
+  <p:cSld>
     <p:bg>
       <p:bgPr>
         <a:gradFill>
@@ -11553,7 +12621,7 @@
             <a:fld id="{00000000-1234-1234-1234-123412341234}" type="slidenum">
               <a:rPr lang="en"/>
               <a:pPr/>
-              <a:t>10</a:t>
+              <a:t>12</a:t>
             </a:fld>
             <a:endParaRPr/>
           </a:p>
@@ -12099,7 +13167,7 @@
 </p:sld>
 </file>
 
-<file path=ppt/slides/slide11.xml><?xml version="1.0" encoding="utf-8"?>
+<file path=ppt/slides/slide13.xml><?xml version="1.0" encoding="utf-8"?>
 <p:sld xmlns:a="http://schemas.openxmlformats.org/drawingml/2006/main" xmlns:r="http://schemas.openxmlformats.org/officeDocument/2006/relationships" xmlns:p="http://schemas.openxmlformats.org/presentationml/2006/main">
   <p:cSld>
     <p:bg>
@@ -12156,7 +13224,7 @@
             <a:fld id="{00000000-1234-1234-1234-123412341234}" type="slidenum">
               <a:rPr lang="en"/>
               <a:pPr/>
-              <a:t>11</a:t>
+              <a:t>13</a:t>
             </a:fld>
             <a:endParaRPr/>
           </a:p>
@@ -12702,7 +13770,7 @@
 </p:sld>
 </file>
 
-<file path=ppt/slides/slide12.xml><?xml version="1.0" encoding="utf-8"?>
+<file path=ppt/slides/slide14.xml><?xml version="1.0" encoding="utf-8"?>
 <p:sld xmlns:a="http://schemas.openxmlformats.org/drawingml/2006/main" xmlns:r="http://schemas.openxmlformats.org/officeDocument/2006/relationships" xmlns:p="http://schemas.openxmlformats.org/presentationml/2006/main">
   <p:cSld>
     <p:spTree>
@@ -12867,7 +13935,7 @@
               <a:pPr>
                 <a:buSzPts val="1100"/>
               </a:pPr>
-              <a:t>12</a:t>
+              <a:t>14</a:t>
             </a:fld>
             <a:endParaRPr/>
           </a:p>
@@ -13075,7 +14143,7 @@
 </p:sld>
 </file>
 
-<file path=ppt/slides/slide13.xml><?xml version="1.0" encoding="utf-8"?>
+<file path=ppt/slides/slide15.xml><?xml version="1.0" encoding="utf-8"?>
 <p:sld xmlns:a="http://schemas.openxmlformats.org/drawingml/2006/main" xmlns:r="http://schemas.openxmlformats.org/officeDocument/2006/relationships" xmlns:p="http://schemas.openxmlformats.org/presentationml/2006/main">
   <p:cSld>
     <p:bg>
@@ -13132,7 +14200,7 @@
             <a:fld id="{00000000-1234-1234-1234-123412341234}" type="slidenum">
               <a:rPr lang="en"/>
               <a:pPr/>
-              <a:t>13</a:t>
+              <a:t>15</a:t>
             </a:fld>
             <a:endParaRPr/>
           </a:p>
@@ -13717,7 +14785,7 @@
 </p:sld>
 </file>
 
-<file path=ppt/slides/slide14.xml><?xml version="1.0" encoding="utf-8"?>
+<file path=ppt/slides/slide16.xml><?xml version="1.0" encoding="utf-8"?>
 <p:sld xmlns:a="http://schemas.openxmlformats.org/drawingml/2006/main" xmlns:r="http://schemas.openxmlformats.org/officeDocument/2006/relationships" xmlns:p="http://schemas.openxmlformats.org/presentationml/2006/main">
   <p:cSld>
     <p:bg>
@@ -13774,7 +14842,7 @@
             <a:fld id="{00000000-1234-1234-1234-123412341234}" type="slidenum">
               <a:rPr lang="en"/>
               <a:pPr/>
-              <a:t>14</a:t>
+              <a:t>16</a:t>
             </a:fld>
             <a:endParaRPr/>
           </a:p>
@@ -14329,7 +15397,7 @@
 </p:sld>
 </file>
 
-<file path=ppt/slides/slide15.xml><?xml version="1.0" encoding="utf-8"?>
+<file path=ppt/slides/slide17.xml><?xml version="1.0" encoding="utf-8"?>
 <p:sld xmlns:a="http://schemas.openxmlformats.org/drawingml/2006/main" xmlns:r="http://schemas.openxmlformats.org/officeDocument/2006/relationships" xmlns:p="http://schemas.openxmlformats.org/presentationml/2006/main">
   <p:cSld>
     <p:bg>
@@ -14386,7 +15454,7 @@
             <a:fld id="{00000000-1234-1234-1234-123412341234}" type="slidenum">
               <a:rPr lang="en"/>
               <a:pPr/>
-              <a:t>15</a:t>
+              <a:t>17</a:t>
             </a:fld>
             <a:endParaRPr/>
           </a:p>
@@ -14941,7 +16009,7 @@
 </p:sld>
 </file>
 
-<file path=ppt/slides/slide16.xml><?xml version="1.0" encoding="utf-8"?>
+<file path=ppt/slides/slide18.xml><?xml version="1.0" encoding="utf-8"?>
 <p:sld xmlns:a="http://schemas.openxmlformats.org/drawingml/2006/main" xmlns:r="http://schemas.openxmlformats.org/officeDocument/2006/relationships" xmlns:p="http://schemas.openxmlformats.org/presentationml/2006/main">
   <p:cSld>
     <p:bg>
@@ -14998,7 +16066,7 @@
             <a:fld id="{00000000-1234-1234-1234-123412341234}" type="slidenum">
               <a:rPr lang="en"/>
               <a:pPr/>
-              <a:t>16</a:t>
+              <a:t>18</a:t>
             </a:fld>
             <a:endParaRPr/>
           </a:p>
@@ -15579,7 +16647,7 @@
 </p:sld>
 </file>
 
-<file path=ppt/slides/slide17.xml><?xml version="1.0" encoding="utf-8"?>
+<file path=ppt/slides/slide19.xml><?xml version="1.0" encoding="utf-8"?>
 <p:sld xmlns:a="http://schemas.openxmlformats.org/drawingml/2006/main" xmlns:r="http://schemas.openxmlformats.org/officeDocument/2006/relationships" xmlns:p="http://schemas.openxmlformats.org/presentationml/2006/main">
   <p:cSld>
     <p:spTree>
@@ -15783,7 +16851,239 @@
 </p:sld>
 </file>
 
-<file path=ppt/slides/slide18.xml><?xml version="1.0" encoding="utf-8"?>
+<file path=ppt/slides/slide2.xml><?xml version="1.0" encoding="utf-8"?>
+<p:sld xmlns:a="http://schemas.openxmlformats.org/drawingml/2006/main" xmlns:r="http://schemas.openxmlformats.org/officeDocument/2006/relationships" xmlns:p="http://schemas.openxmlformats.org/presentationml/2006/main">
+  <p:cSld>
+    <p:spTree>
+      <p:nvGrpSpPr>
+        <p:cNvPr id="1" name=""/>
+        <p:cNvGrpSpPr/>
+        <p:nvPr/>
+      </p:nvGrpSpPr>
+      <p:grpSpPr>
+        <a:xfrm>
+          <a:off x="0" y="0"/>
+          <a:ext cx="0" cy="0"/>
+          <a:chOff x="0" y="0"/>
+          <a:chExt cx="0" cy="0"/>
+        </a:xfrm>
+      </p:grpSpPr>
+      <p:sp>
+        <p:nvSpPr>
+          <p:cNvPr id="10" name="Rectangle 9">
+            <a:extLst>
+              <a:ext uri="{FF2B5EF4-FFF2-40B4-BE49-F238E27FC236}">
+                <a16:creationId xmlns:a16="http://schemas.microsoft.com/office/drawing/2014/main" id="{08E89D5E-1885-4160-AC77-CC471DD1D0DB}"/>
+              </a:ext>
+              <a:ext uri="{C183D7F6-B498-43B3-948B-1728B52AA6E4}">
+                <adec:decorative xmlns:adec="http://schemas.microsoft.com/office/drawing/2017/decorative" val="1"/>
+              </a:ext>
+            </a:extLst>
+          </p:cNvPr>
+          <p:cNvSpPr>
+            <a:spLocks noGrp="1" noRot="1" noChangeAspect="1" noMove="1" noResize="1" noEditPoints="1" noAdjustHandles="1" noChangeArrowheads="1" noChangeShapeType="1" noTextEdit="1"/>
+          </p:cNvSpPr>
+          <p:nvPr>
+            <p:extLst>
+              <p:ext uri="{386F3935-93C4-4BCD-93E2-E3B085C9AB24}">
+                <p16:designElem xmlns:p16="http://schemas.microsoft.com/office/powerpoint/2015/main" val="1"/>
+              </p:ext>
+            </p:extLst>
+          </p:nvPr>
+        </p:nvSpPr>
+        <p:spPr>
+          <a:xfrm>
+            <a:off x="0" y="0"/>
+            <a:ext cx="4636008" cy="6858000"/>
+          </a:xfrm>
+          <a:prstGeom prst="rect">
+            <a:avLst/>
+          </a:prstGeom>
+          <a:ln>
+            <a:noFill/>
+          </a:ln>
+        </p:spPr>
+        <p:style>
+          <a:lnRef idx="2">
+            <a:schemeClr val="accent1">
+              <a:shade val="50000"/>
+            </a:schemeClr>
+          </a:lnRef>
+          <a:fillRef idx="1">
+            <a:schemeClr val="accent1"/>
+          </a:fillRef>
+          <a:effectRef idx="0">
+            <a:schemeClr val="accent1"/>
+          </a:effectRef>
+          <a:fontRef idx="minor">
+            <a:schemeClr val="lt1"/>
+          </a:fontRef>
+        </p:style>
+        <p:txBody>
+          <a:bodyPr rtlCol="0" anchor="ctr"/>
+          <a:lstStyle/>
+          <a:p>
+            <a:pPr algn="ctr"/>
+            <a:endParaRPr lang="en-US"/>
+          </a:p>
+        </p:txBody>
+      </p:sp>
+      <p:sp>
+        <p:nvSpPr>
+          <p:cNvPr id="2" name="כותרת 1">
+            <a:extLst>
+              <a:ext uri="{FF2B5EF4-FFF2-40B4-BE49-F238E27FC236}">
+                <a16:creationId xmlns:a16="http://schemas.microsoft.com/office/drawing/2014/main" id="{5C005CA9-66C8-41C7-839D-A87CFCB40A45}"/>
+              </a:ext>
+            </a:extLst>
+          </p:cNvPr>
+          <p:cNvSpPr>
+            <a:spLocks noGrp="1"/>
+          </p:cNvSpPr>
+          <p:nvPr>
+            <p:ph type="title"/>
+          </p:nvPr>
+        </p:nvSpPr>
+        <p:spPr>
+          <a:xfrm>
+            <a:off x="762000" y="869666"/>
+            <a:ext cx="3370998" cy="5502264"/>
+          </a:xfrm>
+        </p:spPr>
+        <p:txBody>
+          <a:bodyPr>
+            <a:normAutofit/>
+          </a:bodyPr>
+          <a:lstStyle/>
+          <a:p>
+            <a:r>
+              <a:rPr lang="en-US" sz="3200" b="1" u="sng" dirty="0">
+                <a:solidFill>
+                  <a:srgbClr val="FFFFFF"/>
+                </a:solidFill>
+                <a:latin typeface="BN Balls" panose="02000500000000000000" pitchFamily="2" charset="-79"/>
+                <a:cs typeface="BN Balls" panose="02000500000000000000" pitchFamily="2" charset="-79"/>
+              </a:rPr>
+              <a:t>Introduction</a:t>
+            </a:r>
+            <a:br>
+              <a:rPr lang="en-US" sz="3200" dirty="0">
+                <a:solidFill>
+                  <a:srgbClr val="FFFFFF"/>
+                </a:solidFill>
+                <a:latin typeface="BN Balls" panose="02000500000000000000" pitchFamily="2" charset="-79"/>
+                <a:cs typeface="BN Balls" panose="02000500000000000000" pitchFamily="2" charset="-79"/>
+              </a:rPr>
+            </a:br>
+            <a:endParaRPr lang="he-IL" sz="3200" dirty="0">
+              <a:solidFill>
+                <a:srgbClr val="FFFFFF"/>
+              </a:solidFill>
+              <a:latin typeface="BN Balls" panose="02000500000000000000" pitchFamily="2" charset="-79"/>
+              <a:cs typeface="BN Balls" panose="02000500000000000000" pitchFamily="2" charset="-79"/>
+            </a:endParaRPr>
+          </a:p>
+        </p:txBody>
+      </p:sp>
+      <p:cxnSp>
+        <p:nvCxnSpPr>
+          <p:cNvPr id="12" name="Straight Connector 11">
+            <a:extLst>
+              <a:ext uri="{FF2B5EF4-FFF2-40B4-BE49-F238E27FC236}">
+                <a16:creationId xmlns:a16="http://schemas.microsoft.com/office/drawing/2014/main" id="{550D2BD1-98F9-412D-905B-3A843EF4078B}"/>
+              </a:ext>
+              <a:ext uri="{C183D7F6-B498-43B3-948B-1728B52AA6E4}">
+                <adec:decorative xmlns:adec="http://schemas.microsoft.com/office/drawing/2017/decorative" val="1"/>
+              </a:ext>
+            </a:extLst>
+          </p:cNvPr>
+          <p:cNvCxnSpPr>
+            <a:cxnSpLocks noGrp="1" noRot="1" noChangeAspect="1" noMove="1" noResize="1" noEditPoints="1" noAdjustHandles="1" noChangeArrowheads="1" noChangeShapeType="1"/>
+          </p:cNvCxnSpPr>
+          <p:nvPr>
+            <p:extLst>
+              <p:ext uri="{386F3935-93C4-4BCD-93E2-E3B085C9AB24}">
+                <p16:designElem xmlns:p16="http://schemas.microsoft.com/office/powerpoint/2015/main" val="1"/>
+              </p:ext>
+            </p:extLst>
+          </p:nvPr>
+        </p:nvCxnSpPr>
+        <p:spPr>
+          <a:xfrm flipV="1">
+            <a:off x="762000" y="2971800"/>
+            <a:ext cx="0" cy="914400"/>
+          </a:xfrm>
+          <a:prstGeom prst="line">
+            <a:avLst/>
+          </a:prstGeom>
+          <a:ln w="19050">
+            <a:solidFill>
+              <a:srgbClr val="FFFFFF">
+                <a:alpha val="80000"/>
+              </a:srgbClr>
+            </a:solidFill>
+          </a:ln>
+        </p:spPr>
+        <p:style>
+          <a:lnRef idx="1">
+            <a:schemeClr val="accent1"/>
+          </a:lnRef>
+          <a:fillRef idx="0">
+            <a:schemeClr val="accent1"/>
+          </a:fillRef>
+          <a:effectRef idx="0">
+            <a:schemeClr val="accent1"/>
+          </a:effectRef>
+          <a:fontRef idx="minor">
+            <a:schemeClr val="tx1"/>
+          </a:fontRef>
+        </p:style>
+      </p:cxnSp>
+      <p:graphicFrame>
+        <p:nvGraphicFramePr>
+          <p:cNvPr id="5" name="מציין מיקום תוכן 2">
+            <a:extLst>
+              <a:ext uri="{FF2B5EF4-FFF2-40B4-BE49-F238E27FC236}">
+                <a16:creationId xmlns:a16="http://schemas.microsoft.com/office/drawing/2014/main" id="{AAA74886-9BB5-4F86-AFC1-410E25361379}"/>
+              </a:ext>
+            </a:extLst>
+          </p:cNvPr>
+          <p:cNvGraphicFramePr>
+            <a:graphicFrameLocks noGrp="1"/>
+          </p:cNvGraphicFramePr>
+          <p:nvPr>
+            <p:ph idx="1"/>
+            <p:extLst>
+              <p:ext uri="{D42A27DB-BD31-4B8C-83A1-F6EECF244321}">
+                <p14:modId xmlns:p14="http://schemas.microsoft.com/office/powerpoint/2010/main" val="1204130001"/>
+              </p:ext>
+            </p:extLst>
+          </p:nvPr>
+        </p:nvGraphicFramePr>
+        <p:xfrm>
+          <a:off x="5280025" y="642938"/>
+          <a:ext cx="6269038" cy="5572125"/>
+        </p:xfrm>
+        <a:graphic>
+          <a:graphicData uri="http://schemas.openxmlformats.org/drawingml/2006/diagram">
+            <dgm:relIds xmlns:dgm="http://schemas.openxmlformats.org/drawingml/2006/diagram" xmlns:r="http://schemas.openxmlformats.org/officeDocument/2006/relationships" r:dm="rId2" r:lo="rId3" r:qs="rId4" r:cs="rId5"/>
+          </a:graphicData>
+        </a:graphic>
+      </p:graphicFrame>
+    </p:spTree>
+    <p:extLst>
+      <p:ext uri="{BB962C8B-B14F-4D97-AF65-F5344CB8AC3E}">
+        <p14:creationId xmlns:p14="http://schemas.microsoft.com/office/powerpoint/2010/main" val="825447180"/>
+      </p:ext>
+    </p:extLst>
+  </p:cSld>
+  <p:clrMapOvr>
+    <a:masterClrMapping/>
+  </p:clrMapOvr>
+</p:sld>
+</file>
+
+<file path=ppt/slides/slide20.xml><?xml version="1.0" encoding="utf-8"?>
 <p:sld xmlns:a="http://schemas.openxmlformats.org/drawingml/2006/main" xmlns:r="http://schemas.openxmlformats.org/officeDocument/2006/relationships" xmlns:p="http://schemas.openxmlformats.org/presentationml/2006/main">
   <p:cSld>
     <p:spTree>
@@ -16321,7 +17621,7 @@
             <a:fld id="{00000000-1234-1234-1234-123412341234}" type="slidenum">
               <a:rPr lang="en"/>
               <a:pPr/>
-              <a:t>18</a:t>
+              <a:t>20</a:t>
             </a:fld>
             <a:endParaRPr/>
           </a:p>
@@ -16753,7 +18053,7 @@
 </p:sld>
 </file>
 
-<file path=ppt/slides/slide19.xml><?xml version="1.0" encoding="utf-8"?>
+<file path=ppt/slides/slide21.xml><?xml version="1.0" encoding="utf-8"?>
 <p:sld xmlns:a="http://schemas.openxmlformats.org/drawingml/2006/main" xmlns:r="http://schemas.openxmlformats.org/officeDocument/2006/relationships" xmlns:p="http://schemas.openxmlformats.org/presentationml/2006/main">
   <p:cSld>
     <p:bg>
@@ -16810,7 +18110,7 @@
             <a:fld id="{00000000-1234-1234-1234-123412341234}" type="slidenum">
               <a:rPr lang="en"/>
               <a:pPr/>
-              <a:t>19</a:t>
+              <a:t>21</a:t>
             </a:fld>
             <a:endParaRPr/>
           </a:p>
@@ -18510,239 +19810,7 @@
 </p:sld>
 </file>
 
-<file path=ppt/slides/slide2.xml><?xml version="1.0" encoding="utf-8"?>
-<p:sld xmlns:a="http://schemas.openxmlformats.org/drawingml/2006/main" xmlns:r="http://schemas.openxmlformats.org/officeDocument/2006/relationships" xmlns:p="http://schemas.openxmlformats.org/presentationml/2006/main">
-  <p:cSld>
-    <p:spTree>
-      <p:nvGrpSpPr>
-        <p:cNvPr id="1" name=""/>
-        <p:cNvGrpSpPr/>
-        <p:nvPr/>
-      </p:nvGrpSpPr>
-      <p:grpSpPr>
-        <a:xfrm>
-          <a:off x="0" y="0"/>
-          <a:ext cx="0" cy="0"/>
-          <a:chOff x="0" y="0"/>
-          <a:chExt cx="0" cy="0"/>
-        </a:xfrm>
-      </p:grpSpPr>
-      <p:sp>
-        <p:nvSpPr>
-          <p:cNvPr id="10" name="Rectangle 9">
-            <a:extLst>
-              <a:ext uri="{FF2B5EF4-FFF2-40B4-BE49-F238E27FC236}">
-                <a16:creationId xmlns:a16="http://schemas.microsoft.com/office/drawing/2014/main" id="{08E89D5E-1885-4160-AC77-CC471DD1D0DB}"/>
-              </a:ext>
-              <a:ext uri="{C183D7F6-B498-43B3-948B-1728B52AA6E4}">
-                <adec:decorative xmlns:adec="http://schemas.microsoft.com/office/drawing/2017/decorative" val="1"/>
-              </a:ext>
-            </a:extLst>
-          </p:cNvPr>
-          <p:cNvSpPr>
-            <a:spLocks noGrp="1" noRot="1" noChangeAspect="1" noMove="1" noResize="1" noEditPoints="1" noAdjustHandles="1" noChangeArrowheads="1" noChangeShapeType="1" noTextEdit="1"/>
-          </p:cNvSpPr>
-          <p:nvPr>
-            <p:extLst>
-              <p:ext uri="{386F3935-93C4-4BCD-93E2-E3B085C9AB24}">
-                <p16:designElem xmlns:p16="http://schemas.microsoft.com/office/powerpoint/2015/main" val="1"/>
-              </p:ext>
-            </p:extLst>
-          </p:nvPr>
-        </p:nvSpPr>
-        <p:spPr>
-          <a:xfrm>
-            <a:off x="0" y="0"/>
-            <a:ext cx="4636008" cy="6858000"/>
-          </a:xfrm>
-          <a:prstGeom prst="rect">
-            <a:avLst/>
-          </a:prstGeom>
-          <a:ln>
-            <a:noFill/>
-          </a:ln>
-        </p:spPr>
-        <p:style>
-          <a:lnRef idx="2">
-            <a:schemeClr val="accent1">
-              <a:shade val="50000"/>
-            </a:schemeClr>
-          </a:lnRef>
-          <a:fillRef idx="1">
-            <a:schemeClr val="accent1"/>
-          </a:fillRef>
-          <a:effectRef idx="0">
-            <a:schemeClr val="accent1"/>
-          </a:effectRef>
-          <a:fontRef idx="minor">
-            <a:schemeClr val="lt1"/>
-          </a:fontRef>
-        </p:style>
-        <p:txBody>
-          <a:bodyPr rtlCol="0" anchor="ctr"/>
-          <a:lstStyle/>
-          <a:p>
-            <a:pPr algn="ctr"/>
-            <a:endParaRPr lang="en-US"/>
-          </a:p>
-        </p:txBody>
-      </p:sp>
-      <p:sp>
-        <p:nvSpPr>
-          <p:cNvPr id="2" name="כותרת 1">
-            <a:extLst>
-              <a:ext uri="{FF2B5EF4-FFF2-40B4-BE49-F238E27FC236}">
-                <a16:creationId xmlns:a16="http://schemas.microsoft.com/office/drawing/2014/main" id="{5C005CA9-66C8-41C7-839D-A87CFCB40A45}"/>
-              </a:ext>
-            </a:extLst>
-          </p:cNvPr>
-          <p:cNvSpPr>
-            <a:spLocks noGrp="1"/>
-          </p:cNvSpPr>
-          <p:nvPr>
-            <p:ph type="title"/>
-          </p:nvPr>
-        </p:nvSpPr>
-        <p:spPr>
-          <a:xfrm>
-            <a:off x="762000" y="869666"/>
-            <a:ext cx="3370998" cy="5502264"/>
-          </a:xfrm>
-        </p:spPr>
-        <p:txBody>
-          <a:bodyPr>
-            <a:normAutofit/>
-          </a:bodyPr>
-          <a:lstStyle/>
-          <a:p>
-            <a:r>
-              <a:rPr lang="en-US" sz="3200" b="1" u="sng" dirty="0">
-                <a:solidFill>
-                  <a:srgbClr val="FFFFFF"/>
-                </a:solidFill>
-                <a:latin typeface="BN Balls" panose="02000500000000000000" pitchFamily="2" charset="-79"/>
-                <a:cs typeface="BN Balls" panose="02000500000000000000" pitchFamily="2" charset="-79"/>
-              </a:rPr>
-              <a:t>Introduction</a:t>
-            </a:r>
-            <a:br>
-              <a:rPr lang="en-US" sz="3200" dirty="0">
-                <a:solidFill>
-                  <a:srgbClr val="FFFFFF"/>
-                </a:solidFill>
-                <a:latin typeface="BN Balls" panose="02000500000000000000" pitchFamily="2" charset="-79"/>
-                <a:cs typeface="BN Balls" panose="02000500000000000000" pitchFamily="2" charset="-79"/>
-              </a:rPr>
-            </a:br>
-            <a:endParaRPr lang="he-IL" sz="3200" dirty="0">
-              <a:solidFill>
-                <a:srgbClr val="FFFFFF"/>
-              </a:solidFill>
-              <a:latin typeface="BN Balls" panose="02000500000000000000" pitchFamily="2" charset="-79"/>
-              <a:cs typeface="BN Balls" panose="02000500000000000000" pitchFamily="2" charset="-79"/>
-            </a:endParaRPr>
-          </a:p>
-        </p:txBody>
-      </p:sp>
-      <p:cxnSp>
-        <p:nvCxnSpPr>
-          <p:cNvPr id="12" name="Straight Connector 11">
-            <a:extLst>
-              <a:ext uri="{FF2B5EF4-FFF2-40B4-BE49-F238E27FC236}">
-                <a16:creationId xmlns:a16="http://schemas.microsoft.com/office/drawing/2014/main" id="{550D2BD1-98F9-412D-905B-3A843EF4078B}"/>
-              </a:ext>
-              <a:ext uri="{C183D7F6-B498-43B3-948B-1728B52AA6E4}">
-                <adec:decorative xmlns:adec="http://schemas.microsoft.com/office/drawing/2017/decorative" val="1"/>
-              </a:ext>
-            </a:extLst>
-          </p:cNvPr>
-          <p:cNvCxnSpPr>
-            <a:cxnSpLocks noGrp="1" noRot="1" noChangeAspect="1" noMove="1" noResize="1" noEditPoints="1" noAdjustHandles="1" noChangeArrowheads="1" noChangeShapeType="1"/>
-          </p:cNvCxnSpPr>
-          <p:nvPr>
-            <p:extLst>
-              <p:ext uri="{386F3935-93C4-4BCD-93E2-E3B085C9AB24}">
-                <p16:designElem xmlns:p16="http://schemas.microsoft.com/office/powerpoint/2015/main" val="1"/>
-              </p:ext>
-            </p:extLst>
-          </p:nvPr>
-        </p:nvCxnSpPr>
-        <p:spPr>
-          <a:xfrm flipV="1">
-            <a:off x="762000" y="2971800"/>
-            <a:ext cx="0" cy="914400"/>
-          </a:xfrm>
-          <a:prstGeom prst="line">
-            <a:avLst/>
-          </a:prstGeom>
-          <a:ln w="19050">
-            <a:solidFill>
-              <a:srgbClr val="FFFFFF">
-                <a:alpha val="80000"/>
-              </a:srgbClr>
-            </a:solidFill>
-          </a:ln>
-        </p:spPr>
-        <p:style>
-          <a:lnRef idx="1">
-            <a:schemeClr val="accent1"/>
-          </a:lnRef>
-          <a:fillRef idx="0">
-            <a:schemeClr val="accent1"/>
-          </a:fillRef>
-          <a:effectRef idx="0">
-            <a:schemeClr val="accent1"/>
-          </a:effectRef>
-          <a:fontRef idx="minor">
-            <a:schemeClr val="tx1"/>
-          </a:fontRef>
-        </p:style>
-      </p:cxnSp>
-      <p:graphicFrame>
-        <p:nvGraphicFramePr>
-          <p:cNvPr id="5" name="מציין מיקום תוכן 2">
-            <a:extLst>
-              <a:ext uri="{FF2B5EF4-FFF2-40B4-BE49-F238E27FC236}">
-                <a16:creationId xmlns:a16="http://schemas.microsoft.com/office/drawing/2014/main" id="{AAA74886-9BB5-4F86-AFC1-410E25361379}"/>
-              </a:ext>
-            </a:extLst>
-          </p:cNvPr>
-          <p:cNvGraphicFramePr>
-            <a:graphicFrameLocks noGrp="1"/>
-          </p:cNvGraphicFramePr>
-          <p:nvPr>
-            <p:ph idx="1"/>
-            <p:extLst>
-              <p:ext uri="{D42A27DB-BD31-4B8C-83A1-F6EECF244321}">
-                <p14:modId xmlns:p14="http://schemas.microsoft.com/office/powerpoint/2010/main" val="1204130001"/>
-              </p:ext>
-            </p:extLst>
-          </p:nvPr>
-        </p:nvGraphicFramePr>
-        <p:xfrm>
-          <a:off x="5280025" y="642938"/>
-          <a:ext cx="6269038" cy="5572125"/>
-        </p:xfrm>
-        <a:graphic>
-          <a:graphicData uri="http://schemas.openxmlformats.org/drawingml/2006/diagram">
-            <dgm:relIds xmlns:dgm="http://schemas.openxmlformats.org/drawingml/2006/diagram" xmlns:r="http://schemas.openxmlformats.org/officeDocument/2006/relationships" r:dm="rId2" r:lo="rId3" r:qs="rId4" r:cs="rId5"/>
-          </a:graphicData>
-        </a:graphic>
-      </p:graphicFrame>
-    </p:spTree>
-    <p:extLst>
-      <p:ext uri="{BB962C8B-B14F-4D97-AF65-F5344CB8AC3E}">
-        <p14:creationId xmlns:p14="http://schemas.microsoft.com/office/powerpoint/2010/main" val="825447180"/>
-      </p:ext>
-    </p:extLst>
-  </p:cSld>
-  <p:clrMapOvr>
-    <a:masterClrMapping/>
-  </p:clrMapOvr>
-</p:sld>
-</file>
-
-<file path=ppt/slides/slide20.xml><?xml version="1.0" encoding="utf-8"?>
+<file path=ppt/slides/slide22.xml><?xml version="1.0" encoding="utf-8"?>
 <p:sld xmlns:a="http://schemas.openxmlformats.org/drawingml/2006/main" xmlns:r="http://schemas.openxmlformats.org/officeDocument/2006/relationships" xmlns:p="http://schemas.openxmlformats.org/presentationml/2006/main">
   <p:cSld>
     <p:bg>
@@ -18801,7 +19869,7 @@
               <a:pPr>
                 <a:buSzPts val="1100"/>
               </a:pPr>
-              <a:t>20</a:t>
+              <a:t>22</a:t>
             </a:fld>
             <a:endParaRPr/>
           </a:p>
@@ -31324,8 +32392,8 @@
         </p:nvSpPr>
         <p:spPr>
           <a:xfrm>
-            <a:off x="2878037" y="2470882"/>
-            <a:ext cx="6105194" cy="2031055"/>
+            <a:off x="3043403" y="2892531"/>
+            <a:ext cx="6105194" cy="1072937"/>
           </a:xfrm>
         </p:spPr>
         <p:txBody>
@@ -31335,16 +32403,16 @@
           <a:lstStyle/>
           <a:p>
             <a:r>
-              <a:rPr lang="en-US" sz="13800" b="1" dirty="0">
+              <a:rPr lang="en-US" sz="7200" b="1" dirty="0">
                 <a:solidFill>
                   <a:srgbClr val="FFFFFF"/>
                 </a:solidFill>
                 <a:latin typeface="Open Sans Hebrew Light" panose="00000400000000000000" pitchFamily="2" charset="-79"/>
                 <a:cs typeface="Open Sans Hebrew Light" panose="00000400000000000000" pitchFamily="2" charset="-79"/>
               </a:rPr>
-              <a:t>Parts</a:t>
+              <a:t>Known Bugs</a:t>
             </a:r>
-            <a:endParaRPr lang="he-IL" sz="13800" dirty="0">
+            <a:endParaRPr lang="he-IL" sz="7200" dirty="0">
               <a:solidFill>
                 <a:srgbClr val="FFFFFF"/>
               </a:solidFill>
@@ -31370,367 +32438,12 @@
 <file path=ppt/slides/slide8.xml><?xml version="1.0" encoding="utf-8"?>
 <p:sld xmlns:a="http://schemas.openxmlformats.org/drawingml/2006/main" xmlns:r="http://schemas.openxmlformats.org/officeDocument/2006/relationships" xmlns:p="http://schemas.openxmlformats.org/presentationml/2006/main">
   <p:cSld>
-    <p:spTree>
-      <p:nvGrpSpPr>
-        <p:cNvPr id="1" name="Shape 66"/>
-        <p:cNvGrpSpPr/>
-        <p:nvPr/>
-      </p:nvGrpSpPr>
-      <p:grpSpPr>
-        <a:xfrm>
-          <a:off x="0" y="0"/>
-          <a:ext cx="0" cy="0"/>
-          <a:chOff x="0" y="0"/>
-          <a:chExt cx="0" cy="0"/>
-        </a:xfrm>
-      </p:grpSpPr>
-      <p:sp>
-        <p:nvSpPr>
-          <p:cNvPr id="68" name="Google Shape;68;p14"/>
-          <p:cNvSpPr txBox="1">
-            <a:spLocks noGrp="1"/>
-          </p:cNvSpPr>
-          <p:nvPr>
-            <p:ph type="body" idx="2"/>
-          </p:nvPr>
-        </p:nvSpPr>
-        <p:spPr>
-          <a:xfrm>
-            <a:off x="7797732" y="1473929"/>
-            <a:ext cx="3000400" cy="4720800"/>
-          </a:xfrm>
-          <a:prstGeom prst="rect">
-            <a:avLst/>
-          </a:prstGeom>
-        </p:spPr>
-        <p:txBody>
-          <a:bodyPr spcFirstLastPara="1" wrap="square" lIns="0" tIns="0" rIns="0" bIns="0" anchor="t" anchorCtr="0">
-            <a:noAutofit/>
-          </a:bodyPr>
-          <a:lstStyle/>
-          <a:p>
-            <a:pPr marL="285750" indent="-285750" algn="l" rtl="0">
-              <a:buFont typeface="Wingdings" panose="05000000000000000000" pitchFamily="2" charset="2"/>
-              <a:buChar char="v"/>
-            </a:pPr>
-            <a:r>
-              <a:rPr lang="en-US" sz="1600" b="1" dirty="0" err="1">
-                <a:latin typeface="BN Barak" panose="02000000000000000000" pitchFamily="2" charset="-79"/>
-                <a:cs typeface="BN Barak" panose="02000000000000000000" pitchFamily="2" charset="-79"/>
-              </a:rPr>
-              <a:t>Quartet.sol</a:t>
-            </a:r>
-            <a:endParaRPr lang="en-US" sz="1600" b="1" dirty="0">
-              <a:latin typeface="BN Barak" panose="02000000000000000000" pitchFamily="2" charset="-79"/>
-              <a:cs typeface="BN Barak" panose="02000000000000000000" pitchFamily="2" charset="-79"/>
-            </a:endParaRPr>
-          </a:p>
-          <a:p>
-            <a:pPr marL="285750" indent="-285750" algn="l" rtl="0">
-              <a:buFont typeface="Wingdings" panose="05000000000000000000" pitchFamily="2" charset="2"/>
-              <a:buChar char="v"/>
-            </a:pPr>
-            <a:r>
-              <a:rPr lang="en-US" sz="1600" b="1" dirty="0" err="1">
-                <a:latin typeface="BN Barak" panose="02000000000000000000" pitchFamily="2" charset="-79"/>
-                <a:cs typeface="BN Barak" panose="02000000000000000000" pitchFamily="2" charset="-79"/>
-              </a:rPr>
-              <a:t>Card.sol</a:t>
-            </a:r>
-            <a:endParaRPr lang="en-US" sz="1600" b="1" dirty="0">
-              <a:latin typeface="BN Barak" panose="02000000000000000000" pitchFamily="2" charset="-79"/>
-              <a:cs typeface="BN Barak" panose="02000000000000000000" pitchFamily="2" charset="-79"/>
-            </a:endParaRPr>
-          </a:p>
-          <a:p>
-            <a:pPr marL="285750" indent="-285750" algn="l" rtl="0">
-              <a:buFont typeface="Wingdings" panose="05000000000000000000" pitchFamily="2" charset="2"/>
-              <a:buChar char="v"/>
-            </a:pPr>
-            <a:r>
-              <a:rPr lang="en-US" sz="1600" b="1" dirty="0" err="1">
-                <a:latin typeface="BN Barak" panose="02000000000000000000" pitchFamily="2" charset="-79"/>
-                <a:cs typeface="BN Barak" panose="02000000000000000000" pitchFamily="2" charset="-79"/>
-              </a:rPr>
-              <a:t>QuartetCoin.sol</a:t>
-            </a:r>
-            <a:endParaRPr lang="en-US" sz="1600" b="1" dirty="0">
-              <a:latin typeface="BN Barak" panose="02000000000000000000" pitchFamily="2" charset="-79"/>
-              <a:cs typeface="BN Barak" panose="02000000000000000000" pitchFamily="2" charset="-79"/>
-            </a:endParaRPr>
-          </a:p>
-          <a:p>
-            <a:pPr marL="285750" indent="-285750" algn="l" rtl="0">
-              <a:buFont typeface="Wingdings" panose="05000000000000000000" pitchFamily="2" charset="2"/>
-              <a:buChar char="v"/>
-            </a:pPr>
-            <a:endParaRPr lang="en-US" sz="1600" b="1" dirty="0">
-              <a:latin typeface="BN Barak" panose="02000000000000000000" pitchFamily="2" charset="-79"/>
-              <a:cs typeface="BN Barak" panose="02000000000000000000" pitchFamily="2" charset="-79"/>
-            </a:endParaRPr>
-          </a:p>
-          <a:p>
-            <a:pPr marL="285750" indent="-285750" algn="l" rtl="0">
-              <a:buFont typeface="Wingdings" panose="05000000000000000000" pitchFamily="2" charset="2"/>
-              <a:buChar char="v"/>
-            </a:pPr>
-            <a:endParaRPr sz="1600" b="1" dirty="0">
-              <a:latin typeface="BN Barak" panose="02000000000000000000" pitchFamily="2" charset="-79"/>
-              <a:cs typeface="BN Barak" panose="02000000000000000000" pitchFamily="2" charset="-79"/>
-            </a:endParaRPr>
-          </a:p>
-        </p:txBody>
-      </p:sp>
-      <p:sp>
-        <p:nvSpPr>
-          <p:cNvPr id="71" name="Google Shape;71;p14"/>
-          <p:cNvSpPr txBox="1">
-            <a:spLocks noGrp="1"/>
-          </p:cNvSpPr>
-          <p:nvPr>
-            <p:ph type="sldNum" idx="12"/>
-          </p:nvPr>
-        </p:nvSpPr>
-        <p:spPr>
-          <a:xfrm>
-            <a:off x="11307445" y="6333135"/>
-            <a:ext cx="731600" cy="524800"/>
-          </a:xfrm>
-          <a:prstGeom prst="rect">
-            <a:avLst/>
-          </a:prstGeom>
-        </p:spPr>
-        <p:txBody>
-          <a:bodyPr spcFirstLastPara="1" wrap="square" lIns="0" tIns="0" rIns="0" bIns="0" anchor="ctr" anchorCtr="0">
-            <a:noAutofit/>
-          </a:bodyPr>
-          <a:lstStyle/>
-          <a:p>
-            <a:pPr>
-              <a:buSzPts val="1100"/>
-            </a:pPr>
-            <a:fld id="{00000000-1234-1234-1234-123412341234}" type="slidenum">
-              <a:rPr lang="en"/>
-              <a:pPr>
-                <a:buSzPts val="1100"/>
-              </a:pPr>
-              <a:t>8</a:t>
-            </a:fld>
-            <a:endParaRPr/>
-          </a:p>
-        </p:txBody>
-      </p:sp>
-      <p:sp>
-        <p:nvSpPr>
-          <p:cNvPr id="9" name="Google Shape;62;p13"/>
-          <p:cNvSpPr txBox="1">
-            <a:spLocks/>
-          </p:cNvSpPr>
-          <p:nvPr/>
-        </p:nvSpPr>
-        <p:spPr>
-          <a:xfrm>
-            <a:off x="-730606" y="1249076"/>
-            <a:ext cx="6053200" cy="3822493"/>
-          </a:xfrm>
-          <a:prstGeom prst="rect">
-            <a:avLst/>
-          </a:prstGeom>
-        </p:spPr>
-        <p:txBody>
-          <a:bodyPr spcFirstLastPara="1" vert="horz" wrap="square" lIns="0" tIns="0" rIns="0" bIns="0" rtlCol="1" anchor="ctr" anchorCtr="0">
-            <a:noAutofit/>
-          </a:bodyPr>
-          <a:lstStyle>
-            <a:lvl1pPr lvl="0" algn="r" defTabSz="914400" rtl="1" eaLnBrk="1" latinLnBrk="0" hangingPunct="1">
-              <a:lnSpc>
-                <a:spcPct val="90000"/>
-              </a:lnSpc>
-              <a:spcBef>
-                <a:spcPts val="0"/>
-              </a:spcBef>
-              <a:spcAft>
-                <a:spcPts val="0"/>
-              </a:spcAft>
-              <a:buSzPts val="2600"/>
-              <a:buNone/>
-              <a:defRPr sz="4400" kern="1200">
-                <a:solidFill>
-                  <a:schemeClr val="tx1"/>
-                </a:solidFill>
-                <a:latin typeface="+mj-lt"/>
-                <a:ea typeface="+mj-ea"/>
-                <a:cs typeface="+mj-cs"/>
-              </a:defRPr>
-            </a:lvl1pPr>
-            <a:lvl2pPr lvl="1">
-              <a:spcBef>
-                <a:spcPts val="0"/>
-              </a:spcBef>
-              <a:spcAft>
-                <a:spcPts val="0"/>
-              </a:spcAft>
-              <a:buSzPts val="2600"/>
-              <a:buNone/>
-              <a:defRPr/>
-            </a:lvl2pPr>
-            <a:lvl3pPr lvl="2">
-              <a:spcBef>
-                <a:spcPts val="0"/>
-              </a:spcBef>
-              <a:spcAft>
-                <a:spcPts val="0"/>
-              </a:spcAft>
-              <a:buSzPts val="2600"/>
-              <a:buNone/>
-              <a:defRPr/>
-            </a:lvl3pPr>
-            <a:lvl4pPr lvl="3">
-              <a:spcBef>
-                <a:spcPts val="0"/>
-              </a:spcBef>
-              <a:spcAft>
-                <a:spcPts val="0"/>
-              </a:spcAft>
-              <a:buSzPts val="2600"/>
-              <a:buNone/>
-              <a:defRPr/>
-            </a:lvl4pPr>
-            <a:lvl5pPr lvl="4">
-              <a:spcBef>
-                <a:spcPts val="0"/>
-              </a:spcBef>
-              <a:spcAft>
-                <a:spcPts val="0"/>
-              </a:spcAft>
-              <a:buSzPts val="2600"/>
-              <a:buNone/>
-              <a:defRPr/>
-            </a:lvl5pPr>
-            <a:lvl6pPr lvl="5">
-              <a:spcBef>
-                <a:spcPts val="0"/>
-              </a:spcBef>
-              <a:spcAft>
-                <a:spcPts val="0"/>
-              </a:spcAft>
-              <a:buSzPts val="2600"/>
-              <a:buNone/>
-              <a:defRPr/>
-            </a:lvl6pPr>
-            <a:lvl7pPr lvl="6">
-              <a:spcBef>
-                <a:spcPts val="0"/>
-              </a:spcBef>
-              <a:spcAft>
-                <a:spcPts val="0"/>
-              </a:spcAft>
-              <a:buSzPts val="2600"/>
-              <a:buNone/>
-              <a:defRPr/>
-            </a:lvl7pPr>
-            <a:lvl8pPr lvl="7">
-              <a:spcBef>
-                <a:spcPts val="0"/>
-              </a:spcBef>
-              <a:spcAft>
-                <a:spcPts val="0"/>
-              </a:spcAft>
-              <a:buSzPts val="2600"/>
-              <a:buNone/>
-              <a:defRPr/>
-            </a:lvl8pPr>
-            <a:lvl9pPr lvl="8">
-              <a:spcBef>
-                <a:spcPts val="0"/>
-              </a:spcBef>
-              <a:spcAft>
-                <a:spcPts val="0"/>
-              </a:spcAft>
-              <a:buSzPts val="2600"/>
-              <a:buNone/>
-              <a:defRPr/>
-            </a:lvl9pPr>
-          </a:lstStyle>
-          <a:p>
-            <a:pPr algn="ctr" rtl="0"/>
-            <a:r>
-              <a:rPr lang="en-US" b="1" dirty="0">
-                <a:latin typeface="Buxton Sketch" panose="03080500000500000004" pitchFamily="66" charset="0"/>
-                <a:cs typeface="BN Barak" panose="02000000000000000000" pitchFamily="2" charset="-79"/>
-              </a:rPr>
-              <a:t>Contracts</a:t>
-            </a:r>
-            <a:endParaRPr lang="en-US" sz="2000" dirty="0">
-              <a:latin typeface="Tempus Sans ITC" panose="04020404030D07020202" pitchFamily="82" charset="0"/>
-              <a:cs typeface="BN Barak" panose="02000000000000000000" pitchFamily="2" charset="-79"/>
-            </a:endParaRPr>
-          </a:p>
-        </p:txBody>
-      </p:sp>
-      <p:pic>
-        <p:nvPicPr>
-          <p:cNvPr id="2050" name="Picture 2" descr="×ª××¦××ª ×ª××× × ×¢×××¨ âªcontractâ¬â"/>
-          <p:cNvPicPr>
-            <a:picLocks noChangeAspect="1" noChangeArrowheads="1"/>
-          </p:cNvPicPr>
-          <p:nvPr/>
-        </p:nvPicPr>
-        <p:blipFill>
-          <a:blip r:embed="rId3">
-            <a:extLst>
-              <a:ext uri="{28A0092B-C50C-407E-A947-70E740481C1C}">
-                <a14:useLocalDpi xmlns:a14="http://schemas.microsoft.com/office/drawing/2010/main" val="0"/>
-              </a:ext>
-            </a:extLst>
-          </a:blip>
-          <a:srcRect/>
-          <a:stretch>
-            <a:fillRect/>
-          </a:stretch>
-        </p:blipFill>
-        <p:spPr bwMode="auto">
-          <a:xfrm>
-            <a:off x="1744532" y="3732551"/>
-            <a:ext cx="1078302" cy="1078302"/>
-          </a:xfrm>
-          <a:prstGeom prst="rect">
-            <a:avLst/>
-          </a:prstGeom>
-          <a:noFill/>
-          <a:extLst>
-            <a:ext uri="{909E8E84-426E-40DD-AFC4-6F175D3DCCD1}">
-              <a14:hiddenFill xmlns:a14="http://schemas.microsoft.com/office/drawing/2010/main">
-                <a:solidFill>
-                  <a:srgbClr val="FFFFFF"/>
-                </a:solidFill>
-              </a14:hiddenFill>
-            </a:ext>
-          </a:extLst>
-        </p:spPr>
-      </p:pic>
-    </p:spTree>
-    <p:extLst>
-      <p:ext uri="{BB962C8B-B14F-4D97-AF65-F5344CB8AC3E}">
-        <p14:creationId xmlns:p14="http://schemas.microsoft.com/office/powerpoint/2010/main" val="3224061407"/>
-      </p:ext>
-    </p:extLst>
-  </p:cSld>
-  <p:clrMapOvr>
-    <a:masterClrMapping/>
-  </p:clrMapOvr>
-</p:sld>
-</file>
-
-<file path=ppt/slides/slide9.xml><?xml version="1.0" encoding="utf-8"?>
-<p:sld xmlns:a="http://schemas.openxmlformats.org/drawingml/2006/main" xmlns:r="http://schemas.openxmlformats.org/officeDocument/2006/relationships" xmlns:p="http://schemas.openxmlformats.org/presentationml/2006/main">
-  <p:cSld>
     <p:bg>
       <p:bgPr>
         <a:gradFill>
           <a:gsLst>
-            <a:gs pos="0">
-              <a:srgbClr val="46E180"/>
+            <a:gs pos="38000">
+              <a:srgbClr val="7030A0"/>
             </a:gs>
             <a:gs pos="100000">
               <a:srgbClr val="B8DF32"/>
@@ -31779,7 +32492,7 @@
             <a:fld id="{00000000-1234-1234-1234-123412341234}" type="slidenum">
               <a:rPr lang="en"/>
               <a:pPr/>
-              <a:t>9</a:t>
+              <a:t>8</a:t>
             </a:fld>
             <a:endParaRPr/>
           </a:p>
@@ -31787,479 +32500,14 @@
       </p:sp>
       <p:sp>
         <p:nvSpPr>
-          <p:cNvPr id="18" name="Google Shape;270;p34"/>
-          <p:cNvSpPr/>
-          <p:nvPr/>
-        </p:nvSpPr>
-        <p:spPr>
-          <a:xfrm>
-            <a:off x="5373601" y="1535610"/>
-            <a:ext cx="5140196" cy="4001701"/>
-          </a:xfrm>
-          <a:custGeom>
-            <a:avLst/>
-            <a:gdLst/>
-            <a:ahLst/>
-            <a:cxnLst/>
-            <a:rect l="l" t="t" r="r" b="b"/>
-            <a:pathLst>
-              <a:path w="143434" h="111665" extrusionOk="0">
-                <a:moveTo>
-                  <a:pt x="71751" y="2308"/>
-                </a:moveTo>
-                <a:lnTo>
-                  <a:pt x="71887" y="2376"/>
-                </a:lnTo>
-                <a:lnTo>
-                  <a:pt x="72091" y="2444"/>
-                </a:lnTo>
-                <a:lnTo>
-                  <a:pt x="72159" y="2647"/>
-                </a:lnTo>
-                <a:lnTo>
-                  <a:pt x="72226" y="2783"/>
-                </a:lnTo>
-                <a:lnTo>
-                  <a:pt x="72159" y="2987"/>
-                </a:lnTo>
-                <a:lnTo>
-                  <a:pt x="72091" y="3190"/>
-                </a:lnTo>
-                <a:lnTo>
-                  <a:pt x="71887" y="3258"/>
-                </a:lnTo>
-                <a:lnTo>
-                  <a:pt x="71751" y="3326"/>
-                </a:lnTo>
-                <a:lnTo>
-                  <a:pt x="71548" y="3258"/>
-                </a:lnTo>
-                <a:lnTo>
-                  <a:pt x="71344" y="3190"/>
-                </a:lnTo>
-                <a:lnTo>
-                  <a:pt x="71276" y="2987"/>
-                </a:lnTo>
-                <a:lnTo>
-                  <a:pt x="71208" y="2783"/>
-                </a:lnTo>
-                <a:lnTo>
-                  <a:pt x="71276" y="2647"/>
-                </a:lnTo>
-                <a:lnTo>
-                  <a:pt x="71344" y="2444"/>
-                </a:lnTo>
-                <a:lnTo>
-                  <a:pt x="71548" y="2376"/>
-                </a:lnTo>
-                <a:lnTo>
-                  <a:pt x="71751" y="2308"/>
-                </a:lnTo>
-                <a:close/>
-                <a:moveTo>
-                  <a:pt x="137528" y="5906"/>
-                </a:moveTo>
-                <a:lnTo>
-                  <a:pt x="137596" y="5974"/>
-                </a:lnTo>
-                <a:lnTo>
-                  <a:pt x="137596" y="89604"/>
-                </a:lnTo>
-                <a:lnTo>
-                  <a:pt x="5906" y="89604"/>
-                </a:lnTo>
-                <a:lnTo>
-                  <a:pt x="5906" y="5974"/>
-                </a:lnTo>
-                <a:lnTo>
-                  <a:pt x="5906" y="5906"/>
-                </a:lnTo>
-                <a:close/>
-                <a:moveTo>
-                  <a:pt x="3530" y="0"/>
-                </a:moveTo>
-                <a:lnTo>
-                  <a:pt x="3191" y="68"/>
-                </a:lnTo>
-                <a:lnTo>
-                  <a:pt x="2444" y="339"/>
-                </a:lnTo>
-                <a:lnTo>
-                  <a:pt x="1766" y="679"/>
-                </a:lnTo>
-                <a:lnTo>
-                  <a:pt x="1155" y="1154"/>
-                </a:lnTo>
-                <a:lnTo>
-                  <a:pt x="679" y="1765"/>
-                </a:lnTo>
-                <a:lnTo>
-                  <a:pt x="272" y="2444"/>
-                </a:lnTo>
-                <a:lnTo>
-                  <a:pt x="69" y="3190"/>
-                </a:lnTo>
-                <a:lnTo>
-                  <a:pt x="1" y="3598"/>
-                </a:lnTo>
-                <a:lnTo>
-                  <a:pt x="1" y="4005"/>
-                </a:lnTo>
-                <a:lnTo>
-                  <a:pt x="1" y="91572"/>
-                </a:lnTo>
-                <a:lnTo>
-                  <a:pt x="1" y="91979"/>
-                </a:lnTo>
-                <a:lnTo>
-                  <a:pt x="69" y="92319"/>
-                </a:lnTo>
-                <a:lnTo>
-                  <a:pt x="272" y="93065"/>
-                </a:lnTo>
-                <a:lnTo>
-                  <a:pt x="679" y="93744"/>
-                </a:lnTo>
-                <a:lnTo>
-                  <a:pt x="1155" y="94355"/>
-                </a:lnTo>
-                <a:lnTo>
-                  <a:pt x="1766" y="94830"/>
-                </a:lnTo>
-                <a:lnTo>
-                  <a:pt x="2444" y="95238"/>
-                </a:lnTo>
-                <a:lnTo>
-                  <a:pt x="3191" y="95441"/>
-                </a:lnTo>
-                <a:lnTo>
-                  <a:pt x="3530" y="95509"/>
-                </a:lnTo>
-                <a:lnTo>
-                  <a:pt x="139904" y="95509"/>
-                </a:lnTo>
-                <a:lnTo>
-                  <a:pt x="140311" y="95441"/>
-                </a:lnTo>
-                <a:lnTo>
-                  <a:pt x="141058" y="95238"/>
-                </a:lnTo>
-                <a:lnTo>
-                  <a:pt x="141737" y="94830"/>
-                </a:lnTo>
-                <a:lnTo>
-                  <a:pt x="142280" y="94355"/>
-                </a:lnTo>
-                <a:lnTo>
-                  <a:pt x="142755" y="93744"/>
-                </a:lnTo>
-                <a:lnTo>
-                  <a:pt x="143162" y="93065"/>
-                </a:lnTo>
-                <a:lnTo>
-                  <a:pt x="143366" y="92319"/>
-                </a:lnTo>
-                <a:lnTo>
-                  <a:pt x="143434" y="91979"/>
-                </a:lnTo>
-                <a:lnTo>
-                  <a:pt x="143434" y="91572"/>
-                </a:lnTo>
-                <a:lnTo>
-                  <a:pt x="143434" y="4005"/>
-                </a:lnTo>
-                <a:lnTo>
-                  <a:pt x="143434" y="3598"/>
-                </a:lnTo>
-                <a:lnTo>
-                  <a:pt x="143366" y="3190"/>
-                </a:lnTo>
-                <a:lnTo>
-                  <a:pt x="143162" y="2444"/>
-                </a:lnTo>
-                <a:lnTo>
-                  <a:pt x="142755" y="1765"/>
-                </a:lnTo>
-                <a:lnTo>
-                  <a:pt x="142280" y="1154"/>
-                </a:lnTo>
-                <a:lnTo>
-                  <a:pt x="141737" y="679"/>
-                </a:lnTo>
-                <a:lnTo>
-                  <a:pt x="141058" y="339"/>
-                </a:lnTo>
-                <a:lnTo>
-                  <a:pt x="140311" y="68"/>
-                </a:lnTo>
-                <a:lnTo>
-                  <a:pt x="139904" y="0"/>
-                </a:lnTo>
-                <a:close/>
-                <a:moveTo>
-                  <a:pt x="55324" y="95713"/>
-                </a:moveTo>
-                <a:lnTo>
-                  <a:pt x="55052" y="98971"/>
-                </a:lnTo>
-                <a:lnTo>
-                  <a:pt x="54713" y="102297"/>
-                </a:lnTo>
-                <a:lnTo>
-                  <a:pt x="54374" y="105284"/>
-                </a:lnTo>
-                <a:lnTo>
-                  <a:pt x="53966" y="107388"/>
-                </a:lnTo>
-                <a:lnTo>
-                  <a:pt x="53763" y="108203"/>
-                </a:lnTo>
-                <a:lnTo>
-                  <a:pt x="53627" y="108746"/>
-                </a:lnTo>
-                <a:lnTo>
-                  <a:pt x="53423" y="109153"/>
-                </a:lnTo>
-                <a:lnTo>
-                  <a:pt x="53220" y="109357"/>
-                </a:lnTo>
-                <a:lnTo>
-                  <a:pt x="52677" y="109493"/>
-                </a:lnTo>
-                <a:lnTo>
-                  <a:pt x="51794" y="109696"/>
-                </a:lnTo>
-                <a:lnTo>
-                  <a:pt x="49690" y="110036"/>
-                </a:lnTo>
-                <a:lnTo>
-                  <a:pt x="48061" y="110307"/>
-                </a:lnTo>
-                <a:lnTo>
-                  <a:pt x="47450" y="110443"/>
-                </a:lnTo>
-                <a:lnTo>
-                  <a:pt x="47110" y="110511"/>
-                </a:lnTo>
-                <a:lnTo>
-                  <a:pt x="47042" y="110579"/>
-                </a:lnTo>
-                <a:lnTo>
-                  <a:pt x="47042" y="110783"/>
-                </a:lnTo>
-                <a:lnTo>
-                  <a:pt x="47110" y="110850"/>
-                </a:lnTo>
-                <a:lnTo>
-                  <a:pt x="47585" y="110918"/>
-                </a:lnTo>
-                <a:lnTo>
-                  <a:pt x="48400" y="110986"/>
-                </a:lnTo>
-                <a:lnTo>
-                  <a:pt x="51387" y="111054"/>
-                </a:lnTo>
-                <a:lnTo>
-                  <a:pt x="56071" y="111122"/>
-                </a:lnTo>
-                <a:lnTo>
-                  <a:pt x="87092" y="111122"/>
-                </a:lnTo>
-                <a:lnTo>
-                  <a:pt x="91708" y="111054"/>
-                </a:lnTo>
-                <a:lnTo>
-                  <a:pt x="94695" y="110986"/>
-                </a:lnTo>
-                <a:lnTo>
-                  <a:pt x="95578" y="110918"/>
-                </a:lnTo>
-                <a:lnTo>
-                  <a:pt x="96053" y="110850"/>
-                </a:lnTo>
-                <a:lnTo>
-                  <a:pt x="96121" y="110783"/>
-                </a:lnTo>
-                <a:lnTo>
-                  <a:pt x="96121" y="110579"/>
-                </a:lnTo>
-                <a:lnTo>
-                  <a:pt x="96053" y="110511"/>
-                </a:lnTo>
-                <a:lnTo>
-                  <a:pt x="95713" y="110443"/>
-                </a:lnTo>
-                <a:lnTo>
-                  <a:pt x="95102" y="110307"/>
-                </a:lnTo>
-                <a:lnTo>
-                  <a:pt x="93473" y="110036"/>
-                </a:lnTo>
-                <a:lnTo>
-                  <a:pt x="91369" y="109696"/>
-                </a:lnTo>
-                <a:lnTo>
-                  <a:pt x="90487" y="109493"/>
-                </a:lnTo>
-                <a:lnTo>
-                  <a:pt x="89943" y="109357"/>
-                </a:lnTo>
-                <a:lnTo>
-                  <a:pt x="89740" y="109153"/>
-                </a:lnTo>
-                <a:lnTo>
-                  <a:pt x="89536" y="108746"/>
-                </a:lnTo>
-                <a:lnTo>
-                  <a:pt x="89333" y="108203"/>
-                </a:lnTo>
-                <a:lnTo>
-                  <a:pt x="89197" y="107388"/>
-                </a:lnTo>
-                <a:lnTo>
-                  <a:pt x="88789" y="105284"/>
-                </a:lnTo>
-                <a:lnTo>
-                  <a:pt x="88382" y="102297"/>
-                </a:lnTo>
-                <a:lnTo>
-                  <a:pt x="88043" y="98971"/>
-                </a:lnTo>
-                <a:lnTo>
-                  <a:pt x="87839" y="95713"/>
-                </a:lnTo>
-                <a:close/>
-                <a:moveTo>
-                  <a:pt x="47450" y="111054"/>
-                </a:moveTo>
-                <a:lnTo>
-                  <a:pt x="47450" y="111122"/>
-                </a:lnTo>
-                <a:lnTo>
-                  <a:pt x="47450" y="111393"/>
-                </a:lnTo>
-                <a:lnTo>
-                  <a:pt x="47518" y="111461"/>
-                </a:lnTo>
-                <a:lnTo>
-                  <a:pt x="48807" y="111529"/>
-                </a:lnTo>
-                <a:lnTo>
-                  <a:pt x="52473" y="111597"/>
-                </a:lnTo>
-                <a:lnTo>
-                  <a:pt x="62384" y="111665"/>
-                </a:lnTo>
-                <a:lnTo>
-                  <a:pt x="80779" y="111665"/>
-                </a:lnTo>
-                <a:lnTo>
-                  <a:pt x="90622" y="111597"/>
-                </a:lnTo>
-                <a:lnTo>
-                  <a:pt x="94356" y="111529"/>
-                </a:lnTo>
-                <a:lnTo>
-                  <a:pt x="95646" y="111461"/>
-                </a:lnTo>
-                <a:lnTo>
-                  <a:pt x="95713" y="111393"/>
-                </a:lnTo>
-                <a:lnTo>
-                  <a:pt x="95713" y="111122"/>
-                </a:lnTo>
-                <a:lnTo>
-                  <a:pt x="95646" y="111054"/>
-                </a:lnTo>
-                <a:lnTo>
-                  <a:pt x="94084" y="111122"/>
-                </a:lnTo>
-                <a:lnTo>
-                  <a:pt x="91233" y="111190"/>
-                </a:lnTo>
-                <a:lnTo>
-                  <a:pt x="80847" y="111258"/>
-                </a:lnTo>
-                <a:lnTo>
-                  <a:pt x="62316" y="111258"/>
-                </a:lnTo>
-                <a:lnTo>
-                  <a:pt x="51930" y="111190"/>
-                </a:lnTo>
-                <a:lnTo>
-                  <a:pt x="49079" y="111122"/>
-                </a:lnTo>
-                <a:lnTo>
-                  <a:pt x="47518" y="111054"/>
-                </a:lnTo>
-                <a:close/>
-              </a:path>
-            </a:pathLst>
-          </a:custGeom>
-          <a:solidFill>
-            <a:srgbClr val="FFFFFF"/>
-          </a:solidFill>
-          <a:ln>
-            <a:noFill/>
-          </a:ln>
-        </p:spPr>
-        <p:txBody>
-          <a:bodyPr spcFirstLastPara="1" wrap="square" lIns="121900" tIns="121900" rIns="121900" bIns="121900" anchor="ctr" anchorCtr="0">
-            <a:noAutofit/>
-          </a:bodyPr>
-          <a:lstStyle/>
-          <a:p>
-            <a:pPr algn="l" rtl="0">
-              <a:buClr>
-                <a:srgbClr val="000000"/>
-              </a:buClr>
-              <a:buFont typeface="Arial"/>
-              <a:buNone/>
-            </a:pPr>
-            <a:endParaRPr sz="1867" kern="0">
-              <a:solidFill>
-                <a:srgbClr val="000000"/>
-              </a:solidFill>
-              <a:cs typeface="Arial"/>
-              <a:sym typeface="Arial"/>
-            </a:endParaRPr>
-          </a:p>
-        </p:txBody>
-      </p:sp>
-      <p:pic>
-        <p:nvPicPr>
-          <p:cNvPr id="2" name="תמונה 1"/>
-          <p:cNvPicPr>
-            <a:picLocks noChangeAspect="1"/>
-          </p:cNvPicPr>
-          <p:nvPr/>
-        </p:nvPicPr>
-        <p:blipFill>
-          <a:blip r:embed="rId3"/>
-          <a:stretch>
-            <a:fillRect/>
-          </a:stretch>
-        </p:blipFill>
-        <p:spPr>
-          <a:xfrm>
-            <a:off x="5583836" y="1747438"/>
-            <a:ext cx="4721901" cy="3011939"/>
-          </a:xfrm>
-          <a:prstGeom prst="rect">
-            <a:avLst/>
-          </a:prstGeom>
-        </p:spPr>
-      </p:pic>
-      <p:sp>
-        <p:nvSpPr>
-          <p:cNvPr id="20" name="TextBox 19"/>
+          <p:cNvPr id="5" name="TextBox 4"/>
           <p:cNvSpPr txBox="1"/>
           <p:nvPr/>
         </p:nvSpPr>
         <p:spPr>
           <a:xfrm>
-            <a:off x="1543988" y="2008665"/>
-            <a:ext cx="3320321" cy="2677656"/>
+            <a:off x="873126" y="1451083"/>
+            <a:ext cx="9404215" cy="1815882"/>
           </a:xfrm>
           <a:prstGeom prst="rect">
             <a:avLst/>
@@ -32272,39 +32520,67 @@
           </a:bodyPr>
           <a:lstStyle/>
           <a:p>
-            <a:pPr algn="l" rtl="0"/>
+            <a:pPr marL="457200" indent="-457200" algn="l" rtl="0">
+              <a:buFont typeface="Arial" panose="020B0604020202020204" pitchFamily="34" charset="0"/>
+              <a:buChar char="•"/>
+              <a:tabLst>
+                <a:tab pos="5743575" algn="l"/>
+              </a:tabLst>
+            </a:pPr>
             <a:r>
-              <a:rPr lang="en-US" sz="2800" dirty="0" err="1">
+              <a:rPr lang="en-US" sz="2800" dirty="0">
+                <a:ln>
+                  <a:solidFill>
+                    <a:schemeClr val="bg1"/>
+                  </a:solidFill>
+                </a:ln>
                 <a:solidFill>
-                  <a:schemeClr val="accent2">
-                    <a:lumMod val="20000"/>
-                    <a:lumOff val="80000"/>
-                  </a:schemeClr>
+                  <a:schemeClr val="bg1"/>
                 </a:solidFill>
                 <a:latin typeface="Microsoft YaHei UI Light" panose="020B0502040204020203" pitchFamily="34" charset="-122"/>
                 <a:ea typeface="Microsoft YaHei UI Light" panose="020B0502040204020203" pitchFamily="34" charset="-122"/>
               </a:rPr>
-              <a:t>Quartet.sol</a:t>
+              <a:t>Running functions on contract always return null</a:t>
             </a:r>
+          </a:p>
+          <a:p>
+            <a:pPr marL="457200" indent="-457200" algn="l" rtl="0">
+              <a:buFont typeface="Arial" panose="020B0604020202020204" pitchFamily="34" charset="0"/>
+              <a:buChar char="•"/>
+              <a:tabLst>
+                <a:tab pos="5743575" algn="l"/>
+              </a:tabLst>
+            </a:pPr>
             <a:r>
               <a:rPr lang="en-US" sz="2800" dirty="0">
+                <a:ln>
+                  <a:solidFill>
+                    <a:schemeClr val="bg1"/>
+                  </a:solidFill>
+                </a:ln>
                 <a:solidFill>
-                  <a:schemeClr val="accent2">
-                    <a:lumMod val="20000"/>
-                    <a:lumOff val="80000"/>
-                  </a:schemeClr>
+                  <a:schemeClr val="bg1"/>
                 </a:solidFill>
                 <a:latin typeface="Microsoft YaHei UI Light" panose="020B0502040204020203" pitchFamily="34" charset="-122"/>
                 <a:ea typeface="Microsoft YaHei UI Light" panose="020B0502040204020203" pitchFamily="34" charset="-122"/>
               </a:rPr>
-              <a:t> is the main contract – the main that is being called according to user choices in the game. </a:t>
+              <a:t>Client doesn’t validate the entered pk belongs to the user</a:t>
             </a:r>
+          </a:p>
+          <a:p>
+            <a:pPr algn="l" rtl="0">
+              <a:tabLst>
+                <a:tab pos="5743575" algn="l"/>
+              </a:tabLst>
+            </a:pPr>
             <a:endParaRPr lang="he-IL" sz="2800" dirty="0">
+              <a:ln>
+                <a:solidFill>
+                  <a:schemeClr val="bg1"/>
+                </a:solidFill>
+              </a:ln>
               <a:solidFill>
-                <a:schemeClr val="accent2">
-                  <a:lumMod val="20000"/>
-                  <a:lumOff val="80000"/>
-                </a:schemeClr>
+                <a:schemeClr val="bg1"/>
               </a:solidFill>
               <a:latin typeface="Microsoft YaHei UI Light" panose="020B0502040204020203" pitchFamily="34" charset="-122"/>
               <a:ea typeface="Microsoft YaHei UI Light" panose="020B0502040204020203" pitchFamily="34" charset="-122"/>
@@ -32315,7 +32591,215 @@
     </p:spTree>
     <p:extLst>
       <p:ext uri="{BB962C8B-B14F-4D97-AF65-F5344CB8AC3E}">
-        <p14:creationId xmlns:p14="http://schemas.microsoft.com/office/powerpoint/2010/main" val="722688037"/>
+        <p14:creationId xmlns:p14="http://schemas.microsoft.com/office/powerpoint/2010/main" val="1126277370"/>
+      </p:ext>
+    </p:extLst>
+  </p:cSld>
+  <p:clrMapOvr>
+    <a:masterClrMapping/>
+  </p:clrMapOvr>
+</p:sld>
+</file>
+
+<file path=ppt/slides/slide9.xml><?xml version="1.0" encoding="utf-8"?>
+<p:sld xmlns:a="http://schemas.openxmlformats.org/drawingml/2006/main" xmlns:r="http://schemas.openxmlformats.org/officeDocument/2006/relationships" xmlns:p="http://schemas.openxmlformats.org/presentationml/2006/main">
+  <p:cSld>
+    <p:spTree>
+      <p:nvGrpSpPr>
+        <p:cNvPr id="1" name=""/>
+        <p:cNvGrpSpPr/>
+        <p:nvPr/>
+      </p:nvGrpSpPr>
+      <p:grpSpPr>
+        <a:xfrm>
+          <a:off x="0" y="0"/>
+          <a:ext cx="0" cy="0"/>
+          <a:chOff x="0" y="0"/>
+          <a:chExt cx="0" cy="0"/>
+        </a:xfrm>
+      </p:grpSpPr>
+      <p:sp>
+        <p:nvSpPr>
+          <p:cNvPr id="8" name="Rectangle 7">
+            <a:extLst>
+              <a:ext uri="{FF2B5EF4-FFF2-40B4-BE49-F238E27FC236}">
+                <a16:creationId xmlns:a16="http://schemas.microsoft.com/office/drawing/2014/main" id="{23962611-DFD5-4092-AAFD-559E3DFCE2C9}"/>
+              </a:ext>
+              <a:ext uri="{C183D7F6-B498-43B3-948B-1728B52AA6E4}">
+                <adec:decorative xmlns:adec="http://schemas.microsoft.com/office/drawing/2017/decorative" val="1"/>
+              </a:ext>
+            </a:extLst>
+          </p:cNvPr>
+          <p:cNvSpPr>
+            <a:spLocks noGrp="1" noRot="1" noChangeAspect="1" noMove="1" noResize="1" noEditPoints="1" noAdjustHandles="1" noChangeArrowheads="1" noChangeShapeType="1" noTextEdit="1"/>
+          </p:cNvSpPr>
+          <p:nvPr>
+            <p:extLst>
+              <p:ext uri="{386F3935-93C4-4BCD-93E2-E3B085C9AB24}">
+                <p16:designElem xmlns:p16="http://schemas.microsoft.com/office/powerpoint/2015/main" val="1"/>
+              </p:ext>
+            </p:extLst>
+          </p:nvPr>
+        </p:nvSpPr>
+        <p:spPr>
+          <a:xfrm>
+            <a:off x="475488" y="0"/>
+            <a:ext cx="10910292" cy="6858000"/>
+          </a:xfrm>
+          <a:prstGeom prst="rect">
+            <a:avLst/>
+          </a:prstGeom>
+          <a:gradFill>
+            <a:gsLst>
+              <a:gs pos="0">
+                <a:schemeClr val="accent1">
+                  <a:lumMod val="90000"/>
+                </a:schemeClr>
+              </a:gs>
+              <a:gs pos="25000">
+                <a:schemeClr val="accent1">
+                  <a:lumMod val="90000"/>
+                </a:schemeClr>
+              </a:gs>
+              <a:gs pos="94000">
+                <a:schemeClr val="bg2">
+                  <a:lumMod val="25000"/>
+                </a:schemeClr>
+              </a:gs>
+              <a:gs pos="100000">
+                <a:schemeClr val="bg2">
+                  <a:lumMod val="25000"/>
+                </a:schemeClr>
+              </a:gs>
+            </a:gsLst>
+            <a:lin ang="4200000" scaled="0"/>
+          </a:gradFill>
+          <a:ln>
+            <a:noFill/>
+          </a:ln>
+        </p:spPr>
+        <p:style>
+          <a:lnRef idx="2">
+            <a:schemeClr val="accent1">
+              <a:shade val="50000"/>
+            </a:schemeClr>
+          </a:lnRef>
+          <a:fillRef idx="1">
+            <a:schemeClr val="accent1"/>
+          </a:fillRef>
+          <a:effectRef idx="0">
+            <a:schemeClr val="accent1"/>
+          </a:effectRef>
+          <a:fontRef idx="minor">
+            <a:schemeClr val="lt1"/>
+          </a:fontRef>
+        </p:style>
+        <p:txBody>
+          <a:bodyPr rtlCol="0" anchor="ctr"/>
+          <a:lstStyle/>
+          <a:p>
+            <a:pPr algn="ctr"/>
+            <a:endParaRPr lang="en-US"/>
+          </a:p>
+        </p:txBody>
+      </p:sp>
+      <p:pic>
+        <p:nvPicPr>
+          <p:cNvPr id="10" name="Picture 9">
+            <a:extLst>
+              <a:ext uri="{FF2B5EF4-FFF2-40B4-BE49-F238E27FC236}">
+                <a16:creationId xmlns:a16="http://schemas.microsoft.com/office/drawing/2014/main" id="{2270F1FA-0425-408F-9861-80BF5AFB276D}"/>
+              </a:ext>
+              <a:ext uri="{C183D7F6-B498-43B3-948B-1728B52AA6E4}">
+                <adec:decorative xmlns:adec="http://schemas.microsoft.com/office/drawing/2017/decorative" val="1"/>
+              </a:ext>
+            </a:extLst>
+          </p:cNvPr>
+          <p:cNvPicPr>
+            <a:picLocks noGrp="1" noRot="1" noChangeAspect="1" noMove="1" noResize="1" noEditPoints="1" noAdjustHandles="1" noChangeArrowheads="1" noChangeShapeType="1" noCrop="1"/>
+          </p:cNvPicPr>
+          <p:nvPr>
+            <p:extLst>
+              <p:ext uri="{386F3935-93C4-4BCD-93E2-E3B085C9AB24}">
+                <p16:designElem xmlns:p16="http://schemas.microsoft.com/office/powerpoint/2015/main" val="1"/>
+              </p:ext>
+            </p:extLst>
+          </p:nvPr>
+        </p:nvPicPr>
+        <p:blipFill>
+          <a:blip r:embed="rId2">
+            <a:extLst>
+              <a:ext uri="{28A0092B-C50C-407E-A947-70E740481C1C}">
+                <a14:useLocalDpi xmlns:a14="http://schemas.microsoft.com/office/drawing/2010/main" val="0"/>
+              </a:ext>
+            </a:extLst>
+          </a:blip>
+          <a:stretch>
+            <a:fillRect/>
+          </a:stretch>
+        </p:blipFill>
+        <p:spPr>
+          <a:xfrm>
+            <a:off x="0" y="0"/>
+            <a:ext cx="12192000" cy="6858000"/>
+          </a:xfrm>
+          <a:prstGeom prst="rect">
+            <a:avLst/>
+          </a:prstGeom>
+        </p:spPr>
+      </p:pic>
+      <p:sp>
+        <p:nvSpPr>
+          <p:cNvPr id="2" name="כותרת 1">
+            <a:extLst>
+              <a:ext uri="{FF2B5EF4-FFF2-40B4-BE49-F238E27FC236}">
+                <a16:creationId xmlns:a16="http://schemas.microsoft.com/office/drawing/2014/main" id="{1C0DC20E-400E-4C3E-BF17-A3CDCFCE20BB}"/>
+              </a:ext>
+            </a:extLst>
+          </p:cNvPr>
+          <p:cNvSpPr>
+            <a:spLocks noGrp="1"/>
+          </p:cNvSpPr>
+          <p:nvPr>
+            <p:ph type="ctrTitle"/>
+          </p:nvPr>
+        </p:nvSpPr>
+        <p:spPr>
+          <a:xfrm>
+            <a:off x="2878037" y="2470882"/>
+            <a:ext cx="6105194" cy="2031055"/>
+          </a:xfrm>
+        </p:spPr>
+        <p:txBody>
+          <a:bodyPr>
+            <a:noAutofit/>
+          </a:bodyPr>
+          <a:lstStyle/>
+          <a:p>
+            <a:r>
+              <a:rPr lang="en-US" sz="13800" b="1" dirty="0">
+                <a:solidFill>
+                  <a:srgbClr val="FFFFFF"/>
+                </a:solidFill>
+                <a:latin typeface="Open Sans Hebrew Light" panose="00000400000000000000" pitchFamily="2" charset="-79"/>
+                <a:cs typeface="Open Sans Hebrew Light" panose="00000400000000000000" pitchFamily="2" charset="-79"/>
+              </a:rPr>
+              <a:t>Parts</a:t>
+            </a:r>
+            <a:endParaRPr lang="he-IL" sz="13800" dirty="0">
+              <a:solidFill>
+                <a:srgbClr val="FFFFFF"/>
+              </a:solidFill>
+              <a:latin typeface="Open Sans Hebrew Light" panose="00000400000000000000" pitchFamily="2" charset="-79"/>
+              <a:cs typeface="Open Sans Hebrew Light" panose="00000400000000000000" pitchFamily="2" charset="-79"/>
+            </a:endParaRPr>
+          </a:p>
+        </p:txBody>
+      </p:sp>
+    </p:spTree>
+    <p:extLst>
+      <p:ext uri="{BB962C8B-B14F-4D97-AF65-F5344CB8AC3E}">
+        <p14:creationId xmlns:p14="http://schemas.microsoft.com/office/powerpoint/2010/main" val="1948164079"/>
       </p:ext>
     </p:extLst>
   </p:cSld>

</xml_diff>